<commit_message>
- working drawing and documenting flow findings
</commit_message>
<xml_diff>
--- a/documents/Images/IdentityServer Architecture.pptx
+++ b/documents/Images/IdentityServer Architecture.pptx
@@ -7,6 +7,7 @@
   <p:sldIdLst>
     <p:sldId id="256" r:id="rId2"/>
     <p:sldId id="257" r:id="rId3"/>
+    <p:sldId id="258" r:id="rId4"/>
   </p:sldIdLst>
   <p:sldSz cx="12192000" cy="6858000"/>
   <p:notesSz cx="6858000" cy="9144000"/>
@@ -3263,7 +3264,7 @@
         </p:blipFill>
         <p:spPr bwMode="auto">
           <a:xfrm rot="20434067">
-            <a:off x="7969106" y="3933825"/>
+            <a:off x="8875697" y="1488276"/>
             <a:ext cx="603393" cy="603393"/>
           </a:xfrm>
           <a:prstGeom prst="rect">
@@ -3330,8 +3331,8 @@
           <p:nvPr/>
         </p:nvSpPr>
         <p:spPr>
-          <a:xfrm rot="18831785">
-            <a:off x="8571936" y="513296"/>
+          <a:xfrm rot="2768215" flipH="1">
+            <a:off x="800303" y="496344"/>
             <a:ext cx="441146" cy="400110"/>
           </a:xfrm>
           <a:prstGeom prst="rect">
@@ -3468,7 +3469,9 @@
               </a:ext>
             </a:extLst>
           </p:cNvPr>
-          <p:cNvCxnSpPr/>
+          <p:cNvCxnSpPr>
+            <a:cxnSpLocks/>
+          </p:cNvCxnSpPr>
           <p:nvPr/>
         </p:nvCxnSpPr>
         <p:spPr>
@@ -3517,8 +3520,8 @@
           <p:nvPr/>
         </p:nvSpPr>
         <p:spPr>
-          <a:xfrm rot="18831785">
-            <a:off x="8571935" y="1332551"/>
+          <a:xfrm rot="2768215" flipH="1">
+            <a:off x="800302" y="1315599"/>
             <a:ext cx="441146" cy="400110"/>
           </a:xfrm>
           <a:prstGeom prst="rect">
@@ -3567,8 +3570,8 @@
           <p:nvPr/>
         </p:nvSpPr>
         <p:spPr>
-          <a:xfrm rot="18831785">
-            <a:off x="8571935" y="2151808"/>
+          <a:xfrm rot="2631785">
+            <a:off x="800302" y="2134856"/>
             <a:ext cx="441146" cy="400110"/>
           </a:xfrm>
           <a:prstGeom prst="rect">
@@ -3619,8 +3622,8 @@
           <p:nvPr/>
         </p:nvCxnSpPr>
         <p:spPr>
-          <a:xfrm flipV="1">
-            <a:off x="5542406" y="1337108"/>
+          <a:xfrm flipH="1" flipV="1">
+            <a:off x="4225087" y="1145017"/>
             <a:ext cx="1086994" cy="329769"/>
           </a:xfrm>
           <a:prstGeom prst="bentConnector3">
@@ -3668,8 +3671,8 @@
           <p:nvPr/>
         </p:nvCxnSpPr>
         <p:spPr>
-          <a:xfrm flipV="1">
-            <a:off x="6924675" y="713353"/>
+          <a:xfrm flipH="1" flipV="1">
+            <a:off x="2437483" y="427225"/>
             <a:ext cx="1426150" cy="521595"/>
           </a:xfrm>
           <a:prstGeom prst="straightConnector1">
@@ -3715,8 +3718,8 @@
           <p:nvPr/>
         </p:nvCxnSpPr>
         <p:spPr>
-          <a:xfrm>
-            <a:off x="6991351" y="1453242"/>
+          <a:xfrm flipH="1">
+            <a:off x="2504159" y="1167114"/>
             <a:ext cx="1383725" cy="79364"/>
           </a:xfrm>
           <a:prstGeom prst="straightConnector1">
@@ -3762,8 +3765,8 @@
           <p:nvPr/>
         </p:nvCxnSpPr>
         <p:spPr>
-          <a:xfrm>
-            <a:off x="6924675" y="1666876"/>
+          <a:xfrm flipH="1">
+            <a:off x="2437483" y="1380748"/>
             <a:ext cx="1426150" cy="610409"/>
           </a:xfrm>
           <a:prstGeom prst="straightConnector1">
@@ -3808,7 +3811,7 @@
         </p:nvSpPr>
         <p:spPr>
           <a:xfrm>
-            <a:off x="2219325" y="5126176"/>
+            <a:off x="2087343" y="5439659"/>
             <a:ext cx="1162050" cy="369332"/>
           </a:xfrm>
           <a:prstGeom prst="rect">
@@ -3822,6 +3825,7 @@
           </a:bodyPr>
           <a:lstStyle/>
           <a:p>
+            <a:pPr algn="ctr"/>
             <a:r>
               <a:rPr lang="en-US" dirty="0"/>
               <a:t>Users</a:t>
@@ -3843,7 +3847,7 @@
         </p:nvSpPr>
         <p:spPr>
           <a:xfrm>
-            <a:off x="5191037" y="5154744"/>
+            <a:off x="5201780" y="5444004"/>
             <a:ext cx="1162050" cy="369332"/>
           </a:xfrm>
           <a:prstGeom prst="rect">
@@ -3857,6 +3861,7 @@
           </a:bodyPr>
           <a:lstStyle/>
           <a:p>
+            <a:pPr algn="ctr"/>
             <a:r>
               <a:rPr lang="en-US" dirty="0"/>
               <a:t>Clients</a:t>
@@ -3878,7 +3883,7 @@
         </p:nvSpPr>
         <p:spPr>
           <a:xfrm>
-            <a:off x="8459545" y="5126176"/>
+            <a:off x="8630291" y="5439659"/>
             <a:ext cx="1162050" cy="369332"/>
           </a:xfrm>
           <a:prstGeom prst="rect">
@@ -3913,7 +3918,7 @@
         </p:nvSpPr>
         <p:spPr>
           <a:xfrm>
-            <a:off x="7841353" y="4580048"/>
+            <a:off x="8630291" y="2131265"/>
             <a:ext cx="1162050" cy="276999"/>
           </a:xfrm>
           <a:prstGeom prst="rect">
@@ -3927,6 +3932,7 @@
           </a:bodyPr>
           <a:lstStyle/>
           <a:p>
+            <a:pPr algn="ctr"/>
             <a:r>
               <a:rPr lang="en-US" sz="1200" dirty="0"/>
               <a:t>Identity data</a:t>
@@ -3948,7 +3954,7 @@
         </p:nvSpPr>
         <p:spPr>
           <a:xfrm>
-            <a:off x="8827305" y="4580048"/>
+            <a:off x="8711400" y="4572177"/>
             <a:ext cx="1162050" cy="276999"/>
           </a:xfrm>
           <a:prstGeom prst="rect">
@@ -3985,7 +3991,7 @@
         </p:nvSpPr>
         <p:spPr>
           <a:xfrm>
-            <a:off x="4207657" y="3042725"/>
+            <a:off x="4212138" y="2912336"/>
             <a:ext cx="1162050" cy="461665"/>
           </a:xfrm>
           <a:prstGeom prst="rect">
@@ -3999,6 +4005,7 @@
           </a:bodyPr>
           <a:lstStyle/>
           <a:p>
+            <a:pPr algn="r"/>
             <a:r>
               <a:rPr lang="en-US" sz="1200" dirty="0"/>
               <a:t>authenticate users</a:t>
@@ -4020,8 +4027,8 @@
         </p:nvSpPr>
         <p:spPr>
           <a:xfrm>
-            <a:off x="5916243" y="3042725"/>
-            <a:ext cx="1162050" cy="461665"/>
+            <a:off x="5715105" y="2620494"/>
+            <a:ext cx="1762013" cy="461665"/>
           </a:xfrm>
           <a:prstGeom prst="rect">
             <a:avLst/>
@@ -4054,7 +4061,7 @@
           <p:nvPr/>
         </p:nvSpPr>
         <p:spPr>
-          <a:xfrm>
+          <a:xfrm flipH="1">
             <a:off x="5487281" y="616079"/>
             <a:ext cx="1684743" cy="646331"/>
           </a:xfrm>
@@ -4089,8 +4096,8 @@
           <p:nvPr/>
         </p:nvSpPr>
         <p:spPr>
-          <a:xfrm>
-            <a:off x="9273638" y="424194"/>
+          <a:xfrm flipH="1">
+            <a:off x="1502005" y="407242"/>
             <a:ext cx="688170" cy="276999"/>
           </a:xfrm>
           <a:prstGeom prst="rect">
@@ -4124,8 +4131,8 @@
           <p:nvPr/>
         </p:nvSpPr>
         <p:spPr>
-          <a:xfrm>
-            <a:off x="9277510" y="1337108"/>
+          <a:xfrm flipH="1">
+            <a:off x="1505877" y="1320156"/>
             <a:ext cx="688170" cy="276999"/>
           </a:xfrm>
           <a:prstGeom prst="rect">
@@ -4159,8 +4166,8 @@
           <p:nvPr/>
         </p:nvSpPr>
         <p:spPr>
-          <a:xfrm>
-            <a:off x="9292424" y="2094426"/>
+          <a:xfrm flipH="1">
+            <a:off x="1520791" y="2077474"/>
             <a:ext cx="1162047" cy="461665"/>
           </a:xfrm>
           <a:prstGeom prst="rect">
@@ -4195,7 +4202,7 @@
         </p:nvSpPr>
         <p:spPr>
           <a:xfrm>
-            <a:off x="3228975" y="2021722"/>
+            <a:off x="5542584" y="1522104"/>
             <a:ext cx="1629440" cy="369332"/>
           </a:xfrm>
           <a:prstGeom prst="rect">
@@ -4214,6 +4221,88 @@
               <a:t>IdentityServer</a:t>
             </a:r>
             <a:endParaRPr lang="en-US" dirty="0"/>
+          </a:p>
+        </p:txBody>
+      </p:sp>
+      <p:cxnSp>
+        <p:nvCxnSpPr>
+          <p:cNvPr id="67" name="Straight Arrow Connector 66">
+            <a:extLst>
+              <a:ext uri="{FF2B5EF4-FFF2-40B4-BE49-F238E27FC236}">
+                <a16:creationId xmlns:a16="http://schemas.microsoft.com/office/drawing/2014/main" id="{8FB558A3-A88C-4F2F-A4CC-48BD9054A68F}"/>
+              </a:ext>
+            </a:extLst>
+          </p:cNvPr>
+          <p:cNvCxnSpPr>
+            <a:cxnSpLocks/>
+          </p:cNvCxnSpPr>
+          <p:nvPr/>
+        </p:nvCxnSpPr>
+        <p:spPr>
+          <a:xfrm>
+            <a:off x="6316051" y="2037252"/>
+            <a:ext cx="1452251" cy="0"/>
+          </a:xfrm>
+          <a:prstGeom prst="straightConnector1">
+            <a:avLst/>
+          </a:prstGeom>
+          <a:ln>
+            <a:solidFill>
+              <a:schemeClr val="tx1">
+                <a:lumMod val="50000"/>
+                <a:lumOff val="50000"/>
+              </a:schemeClr>
+            </a:solidFill>
+            <a:tailEnd type="triangle"/>
+          </a:ln>
+        </p:spPr>
+        <p:style>
+          <a:lnRef idx="1">
+            <a:schemeClr val="accent1"/>
+          </a:lnRef>
+          <a:fillRef idx="0">
+            <a:schemeClr val="accent1"/>
+          </a:fillRef>
+          <a:effectRef idx="0">
+            <a:schemeClr val="accent1"/>
+          </a:effectRef>
+          <a:fontRef idx="minor">
+            <a:schemeClr val="tx1"/>
+          </a:fontRef>
+        </p:style>
+      </p:cxnSp>
+      <p:sp>
+        <p:nvSpPr>
+          <p:cNvPr id="69" name="TextBox 68">
+            <a:extLst>
+              <a:ext uri="{FF2B5EF4-FFF2-40B4-BE49-F238E27FC236}">
+                <a16:creationId xmlns:a16="http://schemas.microsoft.com/office/drawing/2014/main" id="{931A6941-6FE7-4F4D-B1BC-EA66887A11CA}"/>
+              </a:ext>
+            </a:extLst>
+          </p:cNvPr>
+          <p:cNvSpPr txBox="1"/>
+          <p:nvPr/>
+        </p:nvSpPr>
+        <p:spPr>
+          <a:xfrm>
+            <a:off x="5696665" y="3070819"/>
+            <a:ext cx="1828075" cy="461665"/>
+          </a:xfrm>
+          <a:prstGeom prst="rect">
+            <a:avLst/>
+          </a:prstGeom>
+          <a:noFill/>
+        </p:spPr>
+        <p:txBody>
+          <a:bodyPr wrap="square" rtlCol="0">
+            <a:spAutoFit/>
+          </a:bodyPr>
+          <a:lstStyle/>
+          <a:p>
+            <a:r>
+              <a:rPr lang="en-US" sz="1200" dirty="0"/>
+              <a:t>request identity data from identity resources</a:t>
+            </a:r>
           </a:p>
         </p:txBody>
       </p:sp>
@@ -4261,7 +4350,7 @@
         </p:nvSpPr>
         <p:spPr>
           <a:xfrm>
-            <a:off x="447035" y="4021694"/>
+            <a:off x="4101590" y="4518746"/>
             <a:ext cx="800740" cy="830997"/>
           </a:xfrm>
           <a:prstGeom prst="rect">
@@ -4310,7 +4399,7 @@
         </p:nvGrpSpPr>
         <p:grpSpPr>
           <a:xfrm>
-            <a:off x="3087069" y="3624307"/>
+            <a:off x="6741624" y="4121359"/>
             <a:ext cx="1410288" cy="1682844"/>
             <a:chOff x="3260163" y="2194694"/>
             <a:chExt cx="1410288" cy="1682844"/>
@@ -4478,7 +4567,7 @@
         </p:nvSpPr>
         <p:spPr>
           <a:xfrm rot="18831785">
-            <a:off x="3336218" y="1372897"/>
+            <a:off x="6990773" y="1869949"/>
             <a:ext cx="697627" cy="707886"/>
           </a:xfrm>
           <a:prstGeom prst="rect">
@@ -4543,7 +4632,7 @@
         </p:blipFill>
         <p:spPr bwMode="auto">
           <a:xfrm rot="20434067">
-            <a:off x="6121256" y="4114800"/>
+            <a:off x="10799770" y="1954360"/>
             <a:ext cx="603393" cy="603393"/>
           </a:xfrm>
           <a:prstGeom prst="rect">
@@ -4589,7 +4678,7 @@
         </p:blipFill>
         <p:spPr>
           <a:xfrm flipH="1">
-            <a:off x="6944660" y="3941768"/>
+            <a:off x="10599215" y="4438820"/>
             <a:ext cx="999831" cy="859611"/>
           </a:xfrm>
           <a:prstGeom prst="rect">
@@ -4610,8 +4699,8 @@
           <p:nvPr/>
         </p:nvSpPr>
         <p:spPr>
-          <a:xfrm rot="18831785">
-            <a:off x="9629211" y="518160"/>
+          <a:xfrm rot="2768215" flipH="1">
+            <a:off x="917806" y="755474"/>
             <a:ext cx="441146" cy="400110"/>
           </a:xfrm>
           <a:prstGeom prst="rect">
@@ -4624,7 +4713,7 @@
           </a:solidFill>
         </p:spPr>
         <p:txBody>
-          <a:bodyPr wrap="none">
+          <a:bodyPr wrap="square">
             <a:spAutoFit/>
           </a:bodyPr>
           <a:lstStyle/>
@@ -4661,7 +4750,7 @@
         </p:nvCxnSpPr>
         <p:spPr>
           <a:xfrm>
-            <a:off x="1381125" y="4476154"/>
+            <a:off x="5035680" y="4973206"/>
             <a:ext cx="1417538" cy="0"/>
           </a:xfrm>
           <a:prstGeom prst="straightConnector1">
@@ -4701,13 +4790,15 @@
               </a:ext>
             </a:extLst>
           </p:cNvPr>
-          <p:cNvCxnSpPr/>
+          <p:cNvCxnSpPr>
+            <a:cxnSpLocks/>
+          </p:cNvCxnSpPr>
           <p:nvPr/>
         </p:nvCxnSpPr>
         <p:spPr>
           <a:xfrm>
-            <a:off x="4585646" y="4476154"/>
-            <a:ext cx="1452251" cy="0"/>
+            <a:off x="8240201" y="4973206"/>
+            <a:ext cx="2119954" cy="0"/>
           </a:xfrm>
           <a:prstGeom prst="straightConnector1">
             <a:avLst/>
@@ -4751,7 +4842,7 @@
         </p:nvSpPr>
         <p:spPr>
           <a:xfrm>
-            <a:off x="514350" y="6231076"/>
+            <a:off x="4168905" y="6249828"/>
             <a:ext cx="1162050" cy="369332"/>
           </a:xfrm>
           <a:prstGeom prst="rect">
@@ -4786,7 +4877,7 @@
         </p:nvSpPr>
         <p:spPr>
           <a:xfrm>
-            <a:off x="3486062" y="6259644"/>
+            <a:off x="7140617" y="6278396"/>
             <a:ext cx="1162050" cy="369332"/>
           </a:xfrm>
           <a:prstGeom prst="rect">
@@ -4821,7 +4912,7 @@
         </p:nvSpPr>
         <p:spPr>
           <a:xfrm>
-            <a:off x="6754570" y="6231076"/>
+            <a:off x="10409125" y="6249828"/>
             <a:ext cx="1162050" cy="369332"/>
           </a:xfrm>
           <a:prstGeom prst="rect">
@@ -4856,7 +4947,7 @@
         </p:nvSpPr>
         <p:spPr>
           <a:xfrm>
-            <a:off x="5993503" y="4761023"/>
+            <a:off x="10672017" y="2600583"/>
             <a:ext cx="1162050" cy="276999"/>
           </a:xfrm>
           <a:prstGeom prst="rect">
@@ -4891,7 +4982,7 @@
         </p:nvSpPr>
         <p:spPr>
           <a:xfrm>
-            <a:off x="6979455" y="4761023"/>
+            <a:off x="10634010" y="5258075"/>
             <a:ext cx="1162050" cy="276999"/>
           </a:xfrm>
           <a:prstGeom prst="rect">
@@ -4928,7 +5019,7 @@
         </p:nvSpPr>
         <p:spPr>
           <a:xfrm>
-            <a:off x="10330913" y="429058"/>
+            <a:off x="216809" y="850479"/>
             <a:ext cx="688170" cy="276999"/>
           </a:xfrm>
           <a:prstGeom prst="rect">
@@ -4963,7 +5054,7 @@
         </p:nvSpPr>
         <p:spPr>
           <a:xfrm>
-            <a:off x="336604" y="1950456"/>
+            <a:off x="7602036" y="1515331"/>
             <a:ext cx="1629440" cy="369332"/>
           </a:xfrm>
           <a:prstGeom prst="rect">
@@ -4999,7 +5090,7 @@
         </p:nvSpPr>
         <p:spPr>
           <a:xfrm>
-            <a:off x="3536932" y="2637913"/>
+            <a:off x="6977174" y="3134965"/>
             <a:ext cx="239047" cy="241085"/>
           </a:xfrm>
           <a:prstGeom prst="ellipse">
@@ -5054,7 +5145,7 @@
         </p:nvSpPr>
         <p:spPr>
           <a:xfrm>
-            <a:off x="1831050" y="4334110"/>
+            <a:off x="5485605" y="4831162"/>
             <a:ext cx="256032" cy="256390"/>
           </a:xfrm>
           <a:prstGeom prst="ellipse">
@@ -5109,7 +5200,7 @@
         </p:nvSpPr>
         <p:spPr>
           <a:xfrm>
-            <a:off x="6037897" y="300863"/>
+            <a:off x="4005981" y="797915"/>
             <a:ext cx="256032" cy="256390"/>
           </a:xfrm>
           <a:prstGeom prst="ellipse">
@@ -5164,7 +5255,7 @@
         </p:nvSpPr>
         <p:spPr>
           <a:xfrm>
-            <a:off x="6216978" y="1178944"/>
+            <a:off x="4635401" y="1606444"/>
             <a:ext cx="256032" cy="256390"/>
           </a:xfrm>
           <a:prstGeom prst="ellipse">
@@ -5219,7 +5310,7 @@
         </p:nvSpPr>
         <p:spPr>
           <a:xfrm>
-            <a:off x="3230030" y="3202731"/>
+            <a:off x="6670272" y="3699783"/>
             <a:ext cx="256032" cy="256390"/>
           </a:xfrm>
           <a:prstGeom prst="ellipse">
@@ -5274,7 +5365,7 @@
         </p:nvSpPr>
         <p:spPr>
           <a:xfrm>
-            <a:off x="3893518" y="2884089"/>
+            <a:off x="7371272" y="3423342"/>
             <a:ext cx="237744" cy="237744"/>
           </a:xfrm>
           <a:prstGeom prst="ellipse">
@@ -5331,8 +5422,8 @@
         </p:nvSpPr>
         <p:spPr>
           <a:xfrm>
-            <a:off x="4166254" y="2400756"/>
-            <a:ext cx="466321" cy="466973"/>
+            <a:off x="7722416" y="3126179"/>
+            <a:ext cx="255675" cy="256032"/>
           </a:xfrm>
           <a:prstGeom prst="ellipse">
             <a:avLst/>
@@ -5361,13 +5452,13 @@
           </a:fontRef>
         </p:style>
         <p:txBody>
-          <a:bodyPr rtlCol="0" anchor="ctr"/>
+          <a:bodyPr lIns="0" tIns="0" rIns="0" bIns="0" rtlCol="0" anchor="ctr"/>
           <a:lstStyle/>
           <a:p>
             <a:pPr algn="ctr"/>
             <a:r>
               <a:rPr lang="en-US" sz="1100" dirty="0"/>
-              <a:t>10</a:t>
+              <a:t>11</a:t>
             </a:r>
           </a:p>
         </p:txBody>
@@ -5387,30 +5478,30 @@
           <p:nvPr>
             <p:extLst>
               <p:ext uri="{D42A27DB-BD31-4B8C-83A1-F6EECF244321}">
-                <p14:modId xmlns:p14="http://schemas.microsoft.com/office/powerpoint/2010/main" val="479452824"/>
+                <p14:modId xmlns:p14="http://schemas.microsoft.com/office/powerpoint/2010/main" val="1037521512"/>
               </p:ext>
             </p:extLst>
           </p:nvPr>
         </p:nvGraphicFramePr>
         <p:xfrm>
-          <a:off x="8228220" y="1666293"/>
-          <a:ext cx="3657785" cy="4622800"/>
+          <a:off x="290166" y="1400116"/>
+          <a:ext cx="3705820" cy="5212080"/>
         </p:xfrm>
         <a:graphic>
           <a:graphicData uri="http://schemas.openxmlformats.org/drawingml/2006/table">
             <a:tbl>
               <a:tblPr firstRow="1" bandRow="1">
-                <a:tableStyleId>{5C22544A-7EE6-4342-B048-85BDC9FD1C3A}</a:tableStyleId>
+                <a:tableStyleId>{93296810-A885-4BE3-A3E7-6D5BEEA58F35}</a:tableStyleId>
               </a:tblPr>
               <a:tblGrid>
-                <a:gridCol w="276543">
+                <a:gridCol w="566290">
                   <a:extLst>
                     <a:ext uri="{9D8B030D-6E8A-4147-A177-3AD203B41FA5}">
                       <a16:colId xmlns:a16="http://schemas.microsoft.com/office/drawing/2014/main" val="3769977152"/>
                     </a:ext>
                   </a:extLst>
                 </a:gridCol>
-                <a:gridCol w="3381242">
+                <a:gridCol w="3139530">
                   <a:extLst>
                     <a:ext uri="{9D8B030D-6E8A-4147-A177-3AD203B41FA5}">
                       <a16:colId xmlns:a16="http://schemas.microsoft.com/office/drawing/2014/main" val="1754320607"/>
@@ -5418,13 +5509,17 @@
                   </a:extLst>
                 </a:gridCol>
               </a:tblGrid>
-              <a:tr h="370840">
+              <a:tr h="222358">
                 <a:tc>
                   <a:txBody>
                     <a:bodyPr/>
                     <a:lstStyle/>
                     <a:p>
-                      <a:endParaRPr lang="en-US" sz="1000" dirty="0"/>
+                      <a:pPr algn="ctr"/>
+                      <a:r>
+                        <a:rPr lang="en-US" sz="900" dirty="0"/>
+                        <a:t>Action</a:t>
+                      </a:r>
                     </a:p>
                   </a:txBody>
                   <a:tcPr/>
@@ -5434,7 +5529,11 @@
                     <a:bodyPr/>
                     <a:lstStyle/>
                     <a:p>
-                      <a:endParaRPr lang="en-US" sz="1000" dirty="0"/>
+                      <a:pPr algn="ctr"/>
+                      <a:r>
+                        <a:rPr lang="en-US" sz="900" dirty="0"/>
+                        <a:t>Description</a:t>
+                      </a:r>
                     </a:p>
                   </a:txBody>
                   <a:tcPr/>
@@ -5451,8 +5550,9 @@
                     <a:bodyPr/>
                     <a:lstStyle/>
                     <a:p>
-                      <a:r>
-                        <a:rPr lang="en-US" sz="1000" dirty="0"/>
+                      <a:pPr algn="ctr"/>
+                      <a:r>
+                        <a:rPr lang="en-US" sz="900" dirty="0"/>
                         <a:t>1</a:t>
                       </a:r>
                     </a:p>
@@ -5464,7 +5564,10 @@
                     <a:bodyPr/>
                     <a:lstStyle/>
                     <a:p>
-                      <a:endParaRPr lang="en-US" sz="1000"/>
+                      <a:r>
+                        <a:rPr lang="en-US" sz="900" dirty="0"/>
+                        <a:t>User clicks a link to the access some protected resource data.</a:t>
+                      </a:r>
                     </a:p>
                   </a:txBody>
                   <a:tcPr/>
@@ -5481,8 +5584,9 @@
                     <a:bodyPr/>
                     <a:lstStyle/>
                     <a:p>
-                      <a:r>
-                        <a:rPr lang="en-US" sz="1000" dirty="0"/>
+                      <a:pPr algn="ctr"/>
+                      <a:r>
+                        <a:rPr lang="en-US" sz="900" dirty="0"/>
                         <a:t>2</a:t>
                       </a:r>
                     </a:p>
@@ -5512,14 +5616,9 @@
                         <a:defRPr/>
                       </a:pPr>
                       <a:r>
-                        <a:rPr lang="en-US" sz="1000" dirty="0">
-                          <a:solidFill>
-                            <a:schemeClr val="tx1"/>
-                          </a:solidFill>
-                        </a:rPr>
+                        <a:rPr lang="en-US" sz="900" dirty="0"/>
                         <a:t>Client generates a code verifier, sets code challenge method as SHA-256 and compute code challenge using code verifier as input.</a:t>
                       </a:r>
-                      <a:endParaRPr lang="en-US" sz="1000" dirty="0"/>
                     </a:p>
                   </a:txBody>
                   <a:tcPr/>
@@ -5536,8 +5635,9 @@
                     <a:bodyPr/>
                     <a:lstStyle/>
                     <a:p>
-                      <a:r>
-                        <a:rPr lang="en-US" sz="1000" dirty="0"/>
+                      <a:pPr algn="ctr"/>
+                      <a:r>
+                        <a:rPr lang="en-US" sz="900" dirty="0"/>
                         <a:t>3</a:t>
                       </a:r>
                     </a:p>
@@ -5567,30 +5667,17 @@
                         <a:defRPr/>
                       </a:pPr>
                       <a:r>
-                        <a:rPr lang="en-US" sz="1000" dirty="0">
-                          <a:solidFill>
-                            <a:schemeClr val="tx1"/>
-                          </a:solidFill>
-                        </a:rPr>
+                        <a:rPr lang="en-US" sz="900" dirty="0"/>
                         <a:t>Client sends authentication request with code challenge to </a:t>
                       </a:r>
                       <a:r>
-                        <a:rPr lang="en-US" sz="1000" dirty="0" err="1">
-                          <a:solidFill>
-                            <a:schemeClr val="tx1"/>
-                          </a:solidFill>
-                        </a:rPr>
+                        <a:rPr lang="en-US" sz="900" dirty="0" err="1"/>
                         <a:t>IdentityServer</a:t>
                       </a:r>
                       <a:r>
-                        <a:rPr lang="en-US" sz="1000" dirty="0">
-                          <a:solidFill>
-                            <a:schemeClr val="tx1"/>
-                          </a:solidFill>
-                        </a:rPr>
+                        <a:rPr lang="en-US" sz="900" dirty="0"/>
                         <a:t>.</a:t>
                       </a:r>
-                      <a:endParaRPr lang="en-US" sz="1000" dirty="0"/>
                     </a:p>
                   </a:txBody>
                   <a:tcPr/>
@@ -5607,8 +5694,9 @@
                     <a:bodyPr/>
                     <a:lstStyle/>
                     <a:p>
-                      <a:r>
-                        <a:rPr lang="en-US" sz="1000" dirty="0"/>
+                      <a:pPr algn="ctr"/>
+                      <a:r>
+                        <a:rPr lang="en-US" sz="900" dirty="0"/>
                         <a:t>4</a:t>
                       </a:r>
                     </a:p>
@@ -5638,14 +5726,9 @@
                         <a:defRPr/>
                       </a:pPr>
                       <a:r>
-                        <a:rPr lang="en-US" sz="1000" dirty="0">
-                          <a:solidFill>
-                            <a:schemeClr val="tx1"/>
-                          </a:solidFill>
-                        </a:rPr>
+                        <a:rPr lang="en-US" sz="900" dirty="0"/>
                         <a:t>Prompt user to authenticate with external identity provider.</a:t>
                       </a:r>
-                      <a:endParaRPr lang="en-US" sz="1000" dirty="0"/>
                     </a:p>
                   </a:txBody>
                   <a:tcPr/>
@@ -5662,8 +5745,9 @@
                     <a:bodyPr/>
                     <a:lstStyle/>
                     <a:p>
-                      <a:r>
-                        <a:rPr lang="en-US" sz="1000" dirty="0"/>
+                      <a:pPr algn="ctr"/>
+                      <a:r>
+                        <a:rPr lang="en-US" sz="900" dirty="0"/>
                         <a:t>5</a:t>
                       </a:r>
                     </a:p>
@@ -5693,22 +5777,14 @@
                         <a:defRPr/>
                       </a:pPr>
                       <a:r>
-                        <a:rPr lang="en-US" sz="1000" dirty="0">
-                          <a:solidFill>
-                            <a:schemeClr val="tx1"/>
-                          </a:solidFill>
-                        </a:rPr>
+                        <a:rPr lang="en-US" sz="900" dirty="0"/>
                         <a:t>Return SAML token from external provider back to </a:t>
                       </a:r>
                       <a:r>
-                        <a:rPr lang="en-US" sz="1000" dirty="0" err="1">
-                          <a:solidFill>
-                            <a:schemeClr val="tx1"/>
-                          </a:solidFill>
-                        </a:rPr>
+                        <a:rPr lang="en-US" sz="900" dirty="0" err="1"/>
                         <a:t>IdentityServer</a:t>
                       </a:r>
-                      <a:endParaRPr lang="en-US" sz="1000" dirty="0"/>
+                      <a:endParaRPr lang="en-US" sz="900" dirty="0"/>
                     </a:p>
                   </a:txBody>
                   <a:tcPr/>
@@ -5725,8 +5801,9 @@
                     <a:bodyPr/>
                     <a:lstStyle/>
                     <a:p>
-                      <a:r>
-                        <a:rPr lang="en-US" sz="1000" dirty="0"/>
+                      <a:pPr algn="ctr"/>
+                      <a:r>
+                        <a:rPr lang="en-US" sz="900" dirty="0"/>
                         <a:t>6</a:t>
                       </a:r>
                     </a:p>
@@ -5756,22 +5833,13 @@
                         <a:defRPr/>
                       </a:pPr>
                       <a:r>
-                        <a:rPr lang="en-US" sz="1000" dirty="0" err="1">
-                          <a:solidFill>
-                            <a:schemeClr val="tx1"/>
-                          </a:solidFill>
-                        </a:rPr>
+                        <a:rPr lang="en-US" sz="900" dirty="0" err="1"/>
                         <a:t>IdentityServer</a:t>
                       </a:r>
                       <a:r>
-                        <a:rPr lang="en-US" sz="1000" dirty="0">
-                          <a:solidFill>
-                            <a:schemeClr val="tx1"/>
-                          </a:solidFill>
-                        </a:rPr>
+                        <a:rPr lang="en-US" sz="900" dirty="0"/>
                         <a:t> generates authorization code, save code challenge, code challenge method contained in authorization request.</a:t>
                       </a:r>
-                      <a:endParaRPr lang="en-US" sz="1000" dirty="0"/>
                     </a:p>
                   </a:txBody>
                   <a:tcPr/>
@@ -5788,8 +5856,9 @@
                     <a:bodyPr/>
                     <a:lstStyle/>
                     <a:p>
-                      <a:r>
-                        <a:rPr lang="en-US" sz="1000" dirty="0"/>
+                      <a:pPr algn="ctr"/>
+                      <a:r>
+                        <a:rPr lang="en-US" sz="900" dirty="0"/>
                         <a:t>7</a:t>
                       </a:r>
                     </a:p>
@@ -5819,14 +5888,9 @@
                         <a:defRPr/>
                       </a:pPr>
                       <a:r>
-                        <a:rPr lang="en-US" sz="1000" dirty="0">
-                          <a:solidFill>
-                            <a:schemeClr val="tx1"/>
-                          </a:solidFill>
-                        </a:rPr>
+                        <a:rPr lang="en-US" sz="900" dirty="0"/>
                         <a:t>Return authorization code to Client.</a:t>
                       </a:r>
-                      <a:endParaRPr lang="en-US" sz="1000" dirty="0"/>
                     </a:p>
                   </a:txBody>
                   <a:tcPr/>
@@ -5843,8 +5907,9 @@
                     <a:bodyPr/>
                     <a:lstStyle/>
                     <a:p>
-                      <a:r>
-                        <a:rPr lang="en-US" sz="1000" dirty="0"/>
+                      <a:pPr algn="ctr"/>
+                      <a:r>
+                        <a:rPr lang="en-US" sz="900" dirty="0"/>
                         <a:t>8</a:t>
                       </a:r>
                     </a:p>
@@ -5874,30 +5939,17 @@
                         <a:defRPr/>
                       </a:pPr>
                       <a:r>
-                        <a:rPr lang="en-US" sz="1000" dirty="0">
-                          <a:solidFill>
-                            <a:schemeClr val="tx1"/>
-                          </a:solidFill>
-                        </a:rPr>
+                        <a:rPr lang="en-US" sz="900" dirty="0"/>
                         <a:t>Client sends token request with the code verifier and issued </a:t>
                       </a:r>
                       <a:r>
-                        <a:rPr lang="en-US" sz="1000" dirty="0" err="1">
-                          <a:solidFill>
-                            <a:schemeClr val="tx1"/>
-                          </a:solidFill>
-                        </a:rPr>
+                        <a:rPr lang="en-US" sz="900" dirty="0" err="1"/>
                         <a:t>IdentityServer</a:t>
                       </a:r>
                       <a:r>
-                        <a:rPr lang="en-US" sz="1000" dirty="0">
-                          <a:solidFill>
-                            <a:schemeClr val="tx1"/>
-                          </a:solidFill>
-                        </a:rPr>
+                        <a:rPr lang="en-US" sz="900" dirty="0"/>
                         <a:t> authorization code.</a:t>
                       </a:r>
-                      <a:endParaRPr lang="en-US" sz="1000" dirty="0"/>
                     </a:p>
                   </a:txBody>
                   <a:tcPr/>
@@ -5914,8 +5966,9 @@
                     <a:bodyPr/>
                     <a:lstStyle/>
                     <a:p>
-                      <a:r>
-                        <a:rPr lang="en-US" sz="1000" dirty="0"/>
+                      <a:pPr algn="ctr"/>
+                      <a:r>
+                        <a:rPr lang="en-US" sz="900" dirty="0"/>
                         <a:t>9</a:t>
                       </a:r>
                     </a:p>
@@ -5945,37 +5998,13 @@
                         <a:defRPr/>
                       </a:pPr>
                       <a:r>
-                        <a:rPr lang="en-US" sz="1000" dirty="0" err="1">
-                          <a:solidFill>
-                            <a:schemeClr val="tx1"/>
-                          </a:solidFill>
-                        </a:rPr>
+                        <a:rPr lang="en-US" sz="900" dirty="0" err="1"/>
                         <a:t>IdentityServer</a:t>
                       </a:r>
                       <a:r>
-                        <a:rPr lang="en-US" sz="1000" dirty="0">
-                          <a:solidFill>
-                            <a:schemeClr val="tx1"/>
-                          </a:solidFill>
-                        </a:rPr>
+                        <a:rPr lang="en-US" sz="900" dirty="0"/>
                         <a:t> extracts authorization code  and code verifier and retrieves associated code challenge and code challenge method and compares to confirm the client is the valid owner of the authorization code.</a:t>
                       </a:r>
-                      <a:br>
-                        <a:rPr lang="en-US" sz="1000" dirty="0">
-                          <a:solidFill>
-                            <a:schemeClr val="tx1"/>
-                          </a:solidFill>
-                        </a:rPr>
-                      </a:br>
-                      <a:r>
-                        <a:rPr lang="en-US" sz="1000" dirty="0">
-                          <a:solidFill>
-                            <a:schemeClr val="tx1"/>
-                          </a:solidFill>
-                        </a:rPr>
-                        <a:t>Generates the access token and sends  to Client.</a:t>
-                      </a:r>
-                      <a:endParaRPr lang="en-US" sz="1000" dirty="0"/>
                     </a:p>
                   </a:txBody>
                   <a:tcPr/>
@@ -5986,6 +6015,249 @@
                   </a:ext>
                 </a:extLst>
               </a:tr>
+              <a:tr h="370840">
+                <a:tc>
+                  <a:txBody>
+                    <a:bodyPr/>
+                    <a:lstStyle/>
+                    <a:p>
+                      <a:pPr algn="ctr"/>
+                      <a:r>
+                        <a:rPr lang="en-US" sz="900" dirty="0"/>
+                        <a:t>10</a:t>
+                      </a:r>
+                    </a:p>
+                  </a:txBody>
+                  <a:tcPr/>
+                </a:tc>
+                <a:tc>
+                  <a:txBody>
+                    <a:bodyPr/>
+                    <a:lstStyle/>
+                    <a:p>
+                      <a:pPr marL="0" marR="0" lvl="0" indent="0" algn="l" defTabSz="914400" rtl="0" eaLnBrk="1" fontAlgn="auto" latinLnBrk="0" hangingPunct="1">
+                        <a:lnSpc>
+                          <a:spcPct val="100000"/>
+                        </a:lnSpc>
+                        <a:spcBef>
+                          <a:spcPts val="0"/>
+                        </a:spcBef>
+                        <a:spcAft>
+                          <a:spcPts val="0"/>
+                        </a:spcAft>
+                        <a:buClrTx/>
+                        <a:buSzTx/>
+                        <a:buFontTx/>
+                        <a:buNone/>
+                        <a:tabLst/>
+                        <a:defRPr/>
+                      </a:pPr>
+                      <a:r>
+                        <a:rPr lang="en-US" sz="900" dirty="0"/>
+                        <a:t>Gets the identity data client requested (e.g. </a:t>
+                      </a:r>
+                      <a:r>
+                        <a:rPr lang="en-US" sz="800" i="1" dirty="0" err="1">
+                          <a:latin typeface="Courier New" panose="02070309020205020404" pitchFamily="49" charset="0"/>
+                          <a:cs typeface="Courier New" panose="02070309020205020404" pitchFamily="49" charset="0"/>
+                        </a:rPr>
+                        <a:t>openid</a:t>
+                      </a:r>
+                      <a:r>
+                        <a:rPr lang="en-US" sz="800" i="1" dirty="0">
+                          <a:latin typeface="Courier New" panose="02070309020205020404" pitchFamily="49" charset="0"/>
+                          <a:cs typeface="Courier New" panose="02070309020205020404" pitchFamily="49" charset="0"/>
+                        </a:rPr>
+                        <a:t>, profile</a:t>
+                      </a:r>
+                      <a:r>
+                        <a:rPr lang="en-US" sz="900" dirty="0"/>
+                        <a:t>, …etc.) </a:t>
+                      </a:r>
+                    </a:p>
+                  </a:txBody>
+                  <a:tcPr/>
+                </a:tc>
+                <a:extLst>
+                  <a:ext uri="{0D108BD9-81ED-4DB2-BD59-A6C34878D82A}">
+                    <a16:rowId xmlns:a16="http://schemas.microsoft.com/office/drawing/2014/main" val="1395620984"/>
+                  </a:ext>
+                </a:extLst>
+              </a:tr>
+              <a:tr h="370840">
+                <a:tc>
+                  <a:txBody>
+                    <a:bodyPr/>
+                    <a:lstStyle/>
+                    <a:p>
+                      <a:pPr algn="ctr"/>
+                      <a:r>
+                        <a:rPr lang="en-US" sz="900" dirty="0"/>
+                        <a:t>11</a:t>
+                      </a:r>
+                    </a:p>
+                  </a:txBody>
+                  <a:tcPr/>
+                </a:tc>
+                <a:tc>
+                  <a:txBody>
+                    <a:bodyPr/>
+                    <a:lstStyle/>
+                    <a:p>
+                      <a:pPr marL="0" marR="0" lvl="0" indent="0" algn="l" defTabSz="914400" rtl="0" eaLnBrk="1" fontAlgn="auto" latinLnBrk="0" hangingPunct="1">
+                        <a:lnSpc>
+                          <a:spcPct val="100000"/>
+                        </a:lnSpc>
+                        <a:spcBef>
+                          <a:spcPts val="0"/>
+                        </a:spcBef>
+                        <a:spcAft>
+                          <a:spcPts val="0"/>
+                        </a:spcAft>
+                        <a:buClrTx/>
+                        <a:buSzTx/>
+                        <a:buFontTx/>
+                        <a:buNone/>
+                        <a:tabLst/>
+                        <a:defRPr/>
+                      </a:pPr>
+                      <a:r>
+                        <a:rPr lang="en-US" sz="900" dirty="0"/>
+                        <a:t>Generates the </a:t>
+                      </a:r>
+                      <a:r>
+                        <a:rPr lang="en-US" sz="800" i="1" dirty="0" err="1">
+                          <a:latin typeface="Courier New" panose="02070309020205020404" pitchFamily="49" charset="0"/>
+                          <a:cs typeface="Courier New" panose="02070309020205020404" pitchFamily="49" charset="0"/>
+                        </a:rPr>
+                        <a:t>access_token</a:t>
+                      </a:r>
+                      <a:r>
+                        <a:rPr lang="en-US" sz="800" i="1" dirty="0">
+                          <a:latin typeface="Courier New" panose="02070309020205020404" pitchFamily="49" charset="0"/>
+                          <a:cs typeface="Courier New" panose="02070309020205020404" pitchFamily="49" charset="0"/>
+                        </a:rPr>
+                        <a:t> </a:t>
+                      </a:r>
+                      <a:r>
+                        <a:rPr lang="en-US" sz="900" dirty="0"/>
+                        <a:t>and sends to Client with the </a:t>
+                      </a:r>
+                      <a:r>
+                        <a:rPr lang="en-US" sz="800" i="1" dirty="0" err="1">
+                          <a:latin typeface="Courier New" panose="02070309020205020404" pitchFamily="49" charset="0"/>
+                          <a:cs typeface="Courier New" panose="02070309020205020404" pitchFamily="49" charset="0"/>
+                        </a:rPr>
+                        <a:t>id_token</a:t>
+                      </a:r>
+                      <a:r>
+                        <a:rPr lang="en-US" sz="800" i="1" dirty="0">
+                          <a:latin typeface="Courier New" panose="02070309020205020404" pitchFamily="49" charset="0"/>
+                          <a:cs typeface="Courier New" panose="02070309020205020404" pitchFamily="49" charset="0"/>
+                        </a:rPr>
+                        <a:t> </a:t>
+                      </a:r>
+                      <a:r>
+                        <a:rPr lang="en-US" sz="900" i="0" dirty="0">
+                          <a:latin typeface="+mn-lt"/>
+                          <a:cs typeface="Courier New" panose="02070309020205020404" pitchFamily="49" charset="0"/>
+                        </a:rPr>
+                        <a:t>(if requested)</a:t>
+                      </a:r>
+                      <a:r>
+                        <a:rPr lang="en-US" sz="900" i="0" dirty="0">
+                          <a:latin typeface="+mn-lt"/>
+                        </a:rPr>
+                        <a:t>.</a:t>
+                      </a:r>
+                      <a:endParaRPr lang="en-US" sz="900" dirty="0"/>
+                    </a:p>
+                  </a:txBody>
+                  <a:tcPr/>
+                </a:tc>
+                <a:extLst>
+                  <a:ext uri="{0D108BD9-81ED-4DB2-BD59-A6C34878D82A}">
+                    <a16:rowId xmlns:a16="http://schemas.microsoft.com/office/drawing/2014/main" val="1207935044"/>
+                  </a:ext>
+                </a:extLst>
+              </a:tr>
+              <a:tr h="370840">
+                <a:tc>
+                  <a:txBody>
+                    <a:bodyPr/>
+                    <a:lstStyle/>
+                    <a:p>
+                      <a:pPr algn="ctr"/>
+                      <a:r>
+                        <a:rPr lang="en-US" sz="900" dirty="0"/>
+                        <a:t>12</a:t>
+                      </a:r>
+                    </a:p>
+                  </a:txBody>
+                  <a:tcPr/>
+                </a:tc>
+                <a:tc>
+                  <a:txBody>
+                    <a:bodyPr/>
+                    <a:lstStyle/>
+                    <a:p>
+                      <a:pPr marL="0" marR="0" lvl="0" indent="0" algn="l" defTabSz="914400" rtl="0" eaLnBrk="1" fontAlgn="auto" latinLnBrk="0" hangingPunct="1">
+                        <a:lnSpc>
+                          <a:spcPct val="100000"/>
+                        </a:lnSpc>
+                        <a:spcBef>
+                          <a:spcPts val="0"/>
+                        </a:spcBef>
+                        <a:spcAft>
+                          <a:spcPts val="0"/>
+                        </a:spcAft>
+                        <a:buClrTx/>
+                        <a:buSzTx/>
+                        <a:buFontTx/>
+                        <a:buNone/>
+                        <a:tabLst/>
+                        <a:defRPr/>
+                      </a:pPr>
+                      <a:r>
+                        <a:rPr lang="en-US" sz="900" dirty="0"/>
+                        <a:t>Client access the </a:t>
+                      </a:r>
+                      <a:r>
+                        <a:rPr lang="en-US" sz="900" dirty="0" err="1"/>
+                        <a:t>Api</a:t>
+                      </a:r>
+                      <a:r>
+                        <a:rPr lang="en-US" sz="900" dirty="0"/>
+                        <a:t> using the </a:t>
+                      </a:r>
+                      <a:r>
+                        <a:rPr lang="en-US" sz="800" i="1" dirty="0" err="1">
+                          <a:latin typeface="Courier New" panose="02070309020205020404" pitchFamily="49" charset="0"/>
+                          <a:cs typeface="Courier New" panose="02070309020205020404" pitchFamily="49" charset="0"/>
+                        </a:rPr>
+                        <a:t>access_token</a:t>
+                      </a:r>
+                      <a:r>
+                        <a:rPr lang="en-US" sz="800" i="1" dirty="0">
+                          <a:latin typeface="Courier New" panose="02070309020205020404" pitchFamily="49" charset="0"/>
+                          <a:cs typeface="Courier New" panose="02070309020205020404" pitchFamily="49" charset="0"/>
+                        </a:rPr>
+                        <a:t> </a:t>
+                      </a:r>
+                      <a:r>
+                        <a:rPr lang="en-US" sz="900" dirty="0"/>
+                        <a:t>as a bearer token in the authorize header.</a:t>
+                      </a:r>
+                    </a:p>
+                  </a:txBody>
+                  <a:tcPr/>
+                </a:tc>
+                <a:extLst>
+                  <a:ext uri="{0D108BD9-81ED-4DB2-BD59-A6C34878D82A}">
+                    <a16:rowId xmlns:a16="http://schemas.microsoft.com/office/drawing/2014/main" val="1043760965"/>
+                  </a:ext>
+                </a:extLst>
+              </a:tr>
             </a:tbl>
           </a:graphicData>
         </a:graphic>
@@ -5999,12 +6271,14 @@
               </a:ext>
             </a:extLst>
           </p:cNvPr>
-          <p:cNvCxnSpPr/>
+          <p:cNvCxnSpPr>
+            <a:cxnSpLocks/>
+          </p:cNvCxnSpPr>
           <p:nvPr/>
         </p:nvCxnSpPr>
         <p:spPr>
-          <a:xfrm flipV="1">
-            <a:off x="3639430" y="429058"/>
+          <a:xfrm flipH="1" flipV="1">
+            <a:off x="1607514" y="926110"/>
             <a:ext cx="5714120" cy="721408"/>
           </a:xfrm>
           <a:prstGeom prst="bentConnector3">
@@ -6053,8 +6327,8 @@
           <p:nvPr/>
         </p:nvCxnSpPr>
         <p:spPr>
-          <a:xfrm rot="10800000" flipV="1">
-            <a:off x="4011182" y="741356"/>
+          <a:xfrm rot="10800000" flipH="1" flipV="1">
+            <a:off x="1683948" y="1181934"/>
             <a:ext cx="5342369" cy="560591"/>
           </a:xfrm>
           <a:prstGeom prst="bentConnector3">
@@ -6102,7 +6376,7 @@
         </p:nvGrpSpPr>
         <p:grpSpPr>
           <a:xfrm>
-            <a:off x="2907071" y="1178090"/>
+            <a:off x="6303778" y="1983141"/>
             <a:ext cx="565756" cy="481502"/>
             <a:chOff x="2907071" y="1178090"/>
             <a:chExt cx="565756" cy="481502"/>
@@ -6226,13 +6500,12 @@
           </p:cNvPr>
           <p:cNvCxnSpPr>
             <a:cxnSpLocks/>
-            <a:endCxn id="7" idx="0"/>
           </p:cNvCxnSpPr>
           <p:nvPr/>
         </p:nvCxnSpPr>
         <p:spPr>
           <a:xfrm rot="5400000">
-            <a:off x="2501642" y="2917997"/>
+            <a:off x="5941884" y="3415049"/>
             <a:ext cx="1740247" cy="3"/>
           </a:xfrm>
           <a:prstGeom prst="bentConnector3">
@@ -6278,7 +6551,7 @@
         </p:nvCxnSpPr>
         <p:spPr>
           <a:xfrm rot="16200000" flipV="1">
-            <a:off x="2968501" y="3007743"/>
+            <a:off x="6408743" y="3504795"/>
             <a:ext cx="1375912" cy="0"/>
           </a:xfrm>
           <a:prstGeom prst="bentConnector3">
@@ -6320,13 +6593,13 @@
             </a:extLst>
           </p:cNvPr>
           <p:cNvCxnSpPr>
-            <a:endCxn id="8" idx="0"/>
+            <a:cxnSpLocks/>
           </p:cNvCxnSpPr>
           <p:nvPr/>
         </p:nvCxnSpPr>
         <p:spPr>
           <a:xfrm>
-            <a:off x="4011182" y="2135122"/>
+            <a:off x="7488936" y="2674375"/>
             <a:ext cx="0" cy="1489185"/>
           </a:xfrm>
           <a:prstGeom prst="straightConnector1">
@@ -6372,7 +6645,7 @@
         </p:nvCxnSpPr>
         <p:spPr>
           <a:xfrm flipV="1">
-            <a:off x="4399415" y="1950456"/>
+            <a:off x="7839657" y="2447508"/>
             <a:ext cx="0" cy="1673851"/>
           </a:xfrm>
           <a:prstGeom prst="straightConnector1">
@@ -6418,7 +6691,7 @@
         </p:nvGrpSpPr>
         <p:grpSpPr>
           <a:xfrm>
-            <a:off x="3977417" y="5320164"/>
+            <a:off x="7631972" y="5817216"/>
             <a:ext cx="565756" cy="481502"/>
             <a:chOff x="3977417" y="5320164"/>
             <a:chExt cx="565756" cy="481502"/>
@@ -6545,7 +6818,7 @@
         </p:nvGrpSpPr>
         <p:grpSpPr>
           <a:xfrm>
-            <a:off x="4181930" y="1425542"/>
+            <a:off x="7893635" y="2036894"/>
             <a:ext cx="565756" cy="481502"/>
             <a:chOff x="2907071" y="1178090"/>
             <a:chExt cx="565756" cy="481502"/>
@@ -6658,10 +6931,3205 @@
           </p:txBody>
         </p:sp>
       </p:grpSp>
+      <p:sp>
+        <p:nvSpPr>
+          <p:cNvPr id="190" name="Title 189">
+            <a:extLst>
+              <a:ext uri="{FF2B5EF4-FFF2-40B4-BE49-F238E27FC236}">
+                <a16:creationId xmlns:a16="http://schemas.microsoft.com/office/drawing/2014/main" id="{7D82497B-7ABE-4511-BDC6-07CC4BE8C0E1}"/>
+              </a:ext>
+            </a:extLst>
+          </p:cNvPr>
+          <p:cNvSpPr>
+            <a:spLocks noGrp="1"/>
+          </p:cNvSpPr>
+          <p:nvPr>
+            <p:ph type="title"/>
+          </p:nvPr>
+        </p:nvSpPr>
+        <p:spPr>
+          <a:xfrm>
+            <a:off x="838200" y="215401"/>
+            <a:ext cx="10515600" cy="464244"/>
+          </a:xfrm>
+        </p:spPr>
+        <p:txBody>
+          <a:bodyPr>
+            <a:noAutofit/>
+          </a:bodyPr>
+          <a:lstStyle/>
+          <a:p>
+            <a:pPr algn="ctr"/>
+            <a:r>
+              <a:rPr lang="en-US" sz="2000" b="1" dirty="0"/>
+              <a:t>Authorization Code Flow with PKCE</a:t>
+            </a:r>
+          </a:p>
+        </p:txBody>
+      </p:sp>
+      <p:cxnSp>
+        <p:nvCxnSpPr>
+          <p:cNvPr id="191" name="Straight Arrow Connector 190">
+            <a:extLst>
+              <a:ext uri="{FF2B5EF4-FFF2-40B4-BE49-F238E27FC236}">
+                <a16:creationId xmlns:a16="http://schemas.microsoft.com/office/drawing/2014/main" id="{12FD4F5F-8E93-40CC-8AD3-979D4991263E}"/>
+              </a:ext>
+            </a:extLst>
+          </p:cNvPr>
+          <p:cNvCxnSpPr>
+            <a:cxnSpLocks/>
+          </p:cNvCxnSpPr>
+          <p:nvPr/>
+        </p:nvCxnSpPr>
+        <p:spPr>
+          <a:xfrm>
+            <a:off x="8115523" y="2591481"/>
+            <a:ext cx="2119954" cy="0"/>
+          </a:xfrm>
+          <a:prstGeom prst="straightConnector1">
+            <a:avLst/>
+          </a:prstGeom>
+          <a:ln>
+            <a:solidFill>
+              <a:schemeClr val="tx1">
+                <a:lumMod val="50000"/>
+                <a:lumOff val="50000"/>
+              </a:schemeClr>
+            </a:solidFill>
+            <a:headEnd type="triangle"/>
+            <a:tailEnd type="triangle"/>
+          </a:ln>
+        </p:spPr>
+        <p:style>
+          <a:lnRef idx="1">
+            <a:schemeClr val="accent1"/>
+          </a:lnRef>
+          <a:fillRef idx="0">
+            <a:schemeClr val="accent1"/>
+          </a:fillRef>
+          <a:effectRef idx="0">
+            <a:schemeClr val="accent1"/>
+          </a:effectRef>
+          <a:fontRef idx="minor">
+            <a:schemeClr val="tx1"/>
+          </a:fontRef>
+        </p:style>
+      </p:cxnSp>
+      <p:sp>
+        <p:nvSpPr>
+          <p:cNvPr id="192" name="Oval 191">
+            <a:extLst>
+              <a:ext uri="{FF2B5EF4-FFF2-40B4-BE49-F238E27FC236}">
+                <a16:creationId xmlns:a16="http://schemas.microsoft.com/office/drawing/2014/main" id="{BF4E30D2-E9F0-425D-B896-D72E25847E3D}"/>
+              </a:ext>
+            </a:extLst>
+          </p:cNvPr>
+          <p:cNvSpPr>
+            <a:spLocks noChangeAspect="1"/>
+          </p:cNvSpPr>
+          <p:nvPr/>
+        </p:nvSpPr>
+        <p:spPr>
+          <a:xfrm>
+            <a:off x="8943139" y="2464643"/>
+            <a:ext cx="255675" cy="256032"/>
+          </a:xfrm>
+          <a:prstGeom prst="ellipse">
+            <a:avLst/>
+          </a:prstGeom>
+          <a:solidFill>
+            <a:schemeClr val="tx1">
+              <a:lumMod val="65000"/>
+              <a:lumOff val="35000"/>
+            </a:schemeClr>
+          </a:solidFill>
+        </p:spPr>
+        <p:style>
+          <a:lnRef idx="2">
+            <a:schemeClr val="accent1">
+              <a:shade val="50000"/>
+            </a:schemeClr>
+          </a:lnRef>
+          <a:fillRef idx="1">
+            <a:schemeClr val="accent1"/>
+          </a:fillRef>
+          <a:effectRef idx="0">
+            <a:schemeClr val="accent1"/>
+          </a:effectRef>
+          <a:fontRef idx="minor">
+            <a:schemeClr val="lt1"/>
+          </a:fontRef>
+        </p:style>
+        <p:txBody>
+          <a:bodyPr lIns="0" tIns="0" rIns="0" bIns="0" rtlCol="0" anchor="ctr"/>
+          <a:lstStyle/>
+          <a:p>
+            <a:pPr algn="ctr"/>
+            <a:r>
+              <a:rPr lang="en-US" sz="1100" dirty="0"/>
+              <a:t>10</a:t>
+            </a:r>
+          </a:p>
+        </p:txBody>
+      </p:sp>
+      <p:sp>
+        <p:nvSpPr>
+          <p:cNvPr id="193" name="Oval 192">
+            <a:extLst>
+              <a:ext uri="{FF2B5EF4-FFF2-40B4-BE49-F238E27FC236}">
+                <a16:creationId xmlns:a16="http://schemas.microsoft.com/office/drawing/2014/main" id="{76A2707B-1AE5-493A-A491-780B6C8C40A5}"/>
+              </a:ext>
+            </a:extLst>
+          </p:cNvPr>
+          <p:cNvSpPr>
+            <a:spLocks noChangeAspect="1"/>
+          </p:cNvSpPr>
+          <p:nvPr/>
+        </p:nvSpPr>
+        <p:spPr>
+          <a:xfrm>
+            <a:off x="8943139" y="4831520"/>
+            <a:ext cx="255675" cy="256032"/>
+          </a:xfrm>
+          <a:prstGeom prst="ellipse">
+            <a:avLst/>
+          </a:prstGeom>
+          <a:solidFill>
+            <a:schemeClr val="tx1">
+              <a:lumMod val="65000"/>
+              <a:lumOff val="35000"/>
+            </a:schemeClr>
+          </a:solidFill>
+        </p:spPr>
+        <p:style>
+          <a:lnRef idx="2">
+            <a:schemeClr val="accent1">
+              <a:shade val="50000"/>
+            </a:schemeClr>
+          </a:lnRef>
+          <a:fillRef idx="1">
+            <a:schemeClr val="accent1"/>
+          </a:fillRef>
+          <a:effectRef idx="0">
+            <a:schemeClr val="accent1"/>
+          </a:effectRef>
+          <a:fontRef idx="minor">
+            <a:schemeClr val="lt1"/>
+          </a:fontRef>
+        </p:style>
+        <p:txBody>
+          <a:bodyPr lIns="0" tIns="0" rIns="0" bIns="0" rtlCol="0" anchor="ctr"/>
+          <a:lstStyle/>
+          <a:p>
+            <a:pPr algn="ctr"/>
+            <a:r>
+              <a:rPr lang="en-US" sz="1100" dirty="0"/>
+              <a:t>12</a:t>
+            </a:r>
+          </a:p>
+        </p:txBody>
+      </p:sp>
     </p:spTree>
     <p:extLst>
       <p:ext uri="{BB962C8B-B14F-4D97-AF65-F5344CB8AC3E}">
         <p14:creationId xmlns:p14="http://schemas.microsoft.com/office/powerpoint/2010/main" val="566345285"/>
+      </p:ext>
+    </p:extLst>
+  </p:cSld>
+  <p:clrMapOvr>
+    <a:masterClrMapping/>
+  </p:clrMapOvr>
+</p:sld>
+</file>
+
+<file path=ppt/slides/slide3.xml><?xml version="1.0" encoding="utf-8"?>
+<p:sld xmlns:a="http://schemas.openxmlformats.org/drawingml/2006/main" xmlns:r="http://schemas.openxmlformats.org/officeDocument/2006/relationships" xmlns:p="http://schemas.openxmlformats.org/presentationml/2006/main">
+  <p:cSld>
+    <p:spTree>
+      <p:nvGrpSpPr>
+        <p:cNvPr id="1" name=""/>
+        <p:cNvGrpSpPr/>
+        <p:nvPr/>
+      </p:nvGrpSpPr>
+      <p:grpSpPr>
+        <a:xfrm>
+          <a:off x="0" y="0"/>
+          <a:ext cx="0" cy="0"/>
+          <a:chOff x="0" y="0"/>
+          <a:chExt cx="0" cy="0"/>
+        </a:xfrm>
+      </p:grpSpPr>
+      <p:sp>
+        <p:nvSpPr>
+          <p:cNvPr id="4" name="Rectangle 3">
+            <a:extLst>
+              <a:ext uri="{FF2B5EF4-FFF2-40B4-BE49-F238E27FC236}">
+                <a16:creationId xmlns:a16="http://schemas.microsoft.com/office/drawing/2014/main" id="{01764D0B-8C9E-47C3-A021-74ED9FD81FC9}"/>
+              </a:ext>
+            </a:extLst>
+          </p:cNvPr>
+          <p:cNvSpPr/>
+          <p:nvPr/>
+        </p:nvSpPr>
+        <p:spPr>
+          <a:xfrm>
+            <a:off x="4101590" y="4518746"/>
+            <a:ext cx="800740" cy="830997"/>
+          </a:xfrm>
+          <a:prstGeom prst="rect">
+            <a:avLst/>
+          </a:prstGeom>
+        </p:spPr>
+        <p:txBody>
+          <a:bodyPr wrap="square">
+            <a:spAutoFit/>
+          </a:bodyPr>
+          <a:lstStyle/>
+          <a:p>
+            <a:r>
+              <a:rPr lang="en-US" sz="4800" b="1" dirty="0">
+                <a:solidFill>
+                  <a:schemeClr val="bg2">
+                    <a:lumMod val="75000"/>
+                  </a:schemeClr>
+                </a:solidFill>
+                <a:latin typeface="Font Awesome 5 Free Solid" panose="02000503000000000000" pitchFamily="50" charset="0"/>
+              </a:rPr>
+              <a:t></a:t>
+            </a:r>
+            <a:endParaRPr lang="en-US" sz="4800" dirty="0">
+              <a:solidFill>
+                <a:schemeClr val="bg2">
+                  <a:lumMod val="75000"/>
+                </a:schemeClr>
+              </a:solidFill>
+              <a:latin typeface="Font Awesome 5 Free Solid" panose="02000503000000000000" pitchFamily="50" charset="0"/>
+            </a:endParaRPr>
+          </a:p>
+        </p:txBody>
+      </p:sp>
+      <p:grpSp>
+        <p:nvGrpSpPr>
+          <p:cNvPr id="5" name="Group 4">
+            <a:extLst>
+              <a:ext uri="{FF2B5EF4-FFF2-40B4-BE49-F238E27FC236}">
+                <a16:creationId xmlns:a16="http://schemas.microsoft.com/office/drawing/2014/main" id="{59295006-A2B0-464D-9995-FC20A3C56D8A}"/>
+              </a:ext>
+            </a:extLst>
+          </p:cNvPr>
+          <p:cNvGrpSpPr/>
+          <p:nvPr/>
+        </p:nvGrpSpPr>
+        <p:grpSpPr>
+          <a:xfrm>
+            <a:off x="6741624" y="4121359"/>
+            <a:ext cx="1410288" cy="1682844"/>
+            <a:chOff x="3260163" y="2194694"/>
+            <a:chExt cx="1410288" cy="1682844"/>
+          </a:xfrm>
+        </p:grpSpPr>
+        <p:sp>
+          <p:nvSpPr>
+            <p:cNvPr id="6" name="Rectangle 5">
+              <a:extLst>
+                <a:ext uri="{FF2B5EF4-FFF2-40B4-BE49-F238E27FC236}">
+                  <a16:creationId xmlns:a16="http://schemas.microsoft.com/office/drawing/2014/main" id="{EC735A52-330F-48F1-88B7-A1AA351C0AC9}"/>
+                </a:ext>
+              </a:extLst>
+            </p:cNvPr>
+            <p:cNvSpPr/>
+            <p:nvPr/>
+          </p:nvSpPr>
+          <p:spPr>
+            <a:xfrm>
+              <a:off x="3544857" y="3046541"/>
+              <a:ext cx="954107" cy="830997"/>
+            </a:xfrm>
+            <a:prstGeom prst="rect">
+              <a:avLst/>
+            </a:prstGeom>
+          </p:spPr>
+          <p:txBody>
+            <a:bodyPr wrap="none">
+              <a:spAutoFit/>
+            </a:bodyPr>
+            <a:lstStyle/>
+            <a:p>
+              <a:r>
+                <a:rPr lang="en-US" sz="4800" b="1" dirty="0">
+                  <a:solidFill>
+                    <a:schemeClr val="bg2">
+                      <a:lumMod val="75000"/>
+                    </a:schemeClr>
+                  </a:solidFill>
+                  <a:latin typeface="Font Awesome 5 Free Solid" panose="02000503000000000000" pitchFamily="50" charset="0"/>
+                </a:rPr>
+                <a:t></a:t>
+              </a:r>
+              <a:endParaRPr lang="en-US" sz="4800" dirty="0">
+                <a:solidFill>
+                  <a:schemeClr val="bg2">
+                    <a:lumMod val="75000"/>
+                  </a:schemeClr>
+                </a:solidFill>
+                <a:latin typeface="Font Awesome 5 Free Solid" panose="02000503000000000000" pitchFamily="50" charset="0"/>
+              </a:endParaRPr>
+            </a:p>
+          </p:txBody>
+        </p:sp>
+        <p:sp>
+          <p:nvSpPr>
+            <p:cNvPr id="7" name="Rectangle 6">
+              <a:extLst>
+                <a:ext uri="{FF2B5EF4-FFF2-40B4-BE49-F238E27FC236}">
+                  <a16:creationId xmlns:a16="http://schemas.microsoft.com/office/drawing/2014/main" id="{1195FE42-8E79-4BDA-B50C-D8503C4603A0}"/>
+                </a:ext>
+              </a:extLst>
+            </p:cNvPr>
+            <p:cNvSpPr/>
+            <p:nvPr/>
+          </p:nvSpPr>
+          <p:spPr>
+            <a:xfrm>
+              <a:off x="3260163" y="2358509"/>
+              <a:ext cx="569387" cy="830997"/>
+            </a:xfrm>
+            <a:prstGeom prst="rect">
+              <a:avLst/>
+            </a:prstGeom>
+          </p:spPr>
+          <p:txBody>
+            <a:bodyPr wrap="none">
+              <a:spAutoFit/>
+            </a:bodyPr>
+            <a:lstStyle/>
+            <a:p>
+              <a:r>
+                <a:rPr lang="en-US" sz="4800" b="1" dirty="0">
+                  <a:solidFill>
+                    <a:schemeClr val="bg2">
+                      <a:lumMod val="75000"/>
+                    </a:schemeClr>
+                  </a:solidFill>
+                  <a:latin typeface="Font Awesome 5 Free Solid" panose="02000503000000000000" pitchFamily="50" charset="0"/>
+                </a:rPr>
+                <a:t></a:t>
+              </a:r>
+              <a:endParaRPr lang="en-US" sz="4800" dirty="0">
+                <a:solidFill>
+                  <a:schemeClr val="bg2">
+                    <a:lumMod val="75000"/>
+                  </a:schemeClr>
+                </a:solidFill>
+                <a:latin typeface="Font Awesome 5 Free Solid" panose="02000503000000000000" pitchFamily="50" charset="0"/>
+              </a:endParaRPr>
+            </a:p>
+          </p:txBody>
+        </p:sp>
+        <p:sp>
+          <p:nvSpPr>
+            <p:cNvPr id="8" name="Rectangle 7">
+              <a:extLst>
+                <a:ext uri="{FF2B5EF4-FFF2-40B4-BE49-F238E27FC236}">
+                  <a16:creationId xmlns:a16="http://schemas.microsoft.com/office/drawing/2014/main" id="{015A2818-6C79-4D5D-A684-980A9781FEEE}"/>
+                </a:ext>
+              </a:extLst>
+            </p:cNvPr>
+            <p:cNvSpPr/>
+            <p:nvPr/>
+          </p:nvSpPr>
+          <p:spPr>
+            <a:xfrm>
+              <a:off x="3812524" y="2194694"/>
+              <a:ext cx="857927" cy="1015663"/>
+            </a:xfrm>
+            <a:prstGeom prst="rect">
+              <a:avLst/>
+            </a:prstGeom>
+          </p:spPr>
+          <p:txBody>
+            <a:bodyPr wrap="none">
+              <a:spAutoFit/>
+            </a:bodyPr>
+            <a:lstStyle/>
+            <a:p>
+              <a:r>
+                <a:rPr lang="en-US" sz="6000" b="1" dirty="0">
+                  <a:solidFill>
+                    <a:schemeClr val="bg2">
+                      <a:lumMod val="75000"/>
+                    </a:schemeClr>
+                  </a:solidFill>
+                  <a:latin typeface="Font Awesome 5 Free Solid" panose="02000503000000000000" pitchFamily="50" charset="0"/>
+                </a:rPr>
+                <a:t></a:t>
+              </a:r>
+              <a:endParaRPr lang="en-US" sz="6000" dirty="0">
+                <a:solidFill>
+                  <a:schemeClr val="bg2">
+                    <a:lumMod val="75000"/>
+                  </a:schemeClr>
+                </a:solidFill>
+                <a:latin typeface="Font Awesome 5 Free Solid" panose="02000503000000000000" pitchFamily="50" charset="0"/>
+              </a:endParaRPr>
+            </a:p>
+          </p:txBody>
+        </p:sp>
+      </p:grpSp>
+      <p:sp>
+        <p:nvSpPr>
+          <p:cNvPr id="9" name="Rectangle 8">
+            <a:extLst>
+              <a:ext uri="{FF2B5EF4-FFF2-40B4-BE49-F238E27FC236}">
+                <a16:creationId xmlns:a16="http://schemas.microsoft.com/office/drawing/2014/main" id="{6ACA66C4-A1EF-44AD-96A7-DD8D301D6BA2}"/>
+              </a:ext>
+            </a:extLst>
+          </p:cNvPr>
+          <p:cNvSpPr/>
+          <p:nvPr/>
+        </p:nvSpPr>
+        <p:spPr>
+          <a:xfrm rot="18831785">
+            <a:off x="6990773" y="1869949"/>
+            <a:ext cx="697627" cy="707886"/>
+          </a:xfrm>
+          <a:prstGeom prst="rect">
+            <a:avLst/>
+          </a:prstGeom>
+          <a:solidFill>
+            <a:schemeClr val="bg2">
+              <a:lumMod val="75000"/>
+            </a:schemeClr>
+          </a:solidFill>
+        </p:spPr>
+        <p:txBody>
+          <a:bodyPr wrap="none">
+            <a:spAutoFit/>
+          </a:bodyPr>
+          <a:lstStyle/>
+          <a:p>
+            <a:r>
+              <a:rPr lang="en-US" sz="4000" b="1" dirty="0">
+                <a:solidFill>
+                  <a:schemeClr val="bg1"/>
+                </a:solidFill>
+                <a:latin typeface="Font Awesome 5 Free Solid" panose="02000503000000000000" pitchFamily="50" charset="0"/>
+              </a:rPr>
+              <a:t></a:t>
+            </a:r>
+            <a:endParaRPr lang="en-US" sz="4000" dirty="0">
+              <a:solidFill>
+                <a:schemeClr val="bg1"/>
+              </a:solidFill>
+              <a:latin typeface="Font Awesome 5 Free Solid" panose="02000503000000000000" pitchFamily="50" charset="0"/>
+            </a:endParaRPr>
+          </a:p>
+        </p:txBody>
+      </p:sp>
+      <p:pic>
+        <p:nvPicPr>
+          <p:cNvPr id="10" name="Picture 2" descr="Image result for fingerprint image">
+            <a:extLst>
+              <a:ext uri="{FF2B5EF4-FFF2-40B4-BE49-F238E27FC236}">
+                <a16:creationId xmlns:a16="http://schemas.microsoft.com/office/drawing/2014/main" id="{715EB041-C30B-4F8B-BEFB-96575A80A12B}"/>
+              </a:ext>
+            </a:extLst>
+          </p:cNvPr>
+          <p:cNvPicPr>
+            <a:picLocks noChangeAspect="1" noChangeArrowheads="1"/>
+          </p:cNvPicPr>
+          <p:nvPr/>
+        </p:nvPicPr>
+        <p:blipFill>
+          <a:blip r:embed="rId2">
+            <a:extLst>
+              <a:ext uri="{28A0092B-C50C-407E-A947-70E740481C1C}">
+                <a14:useLocalDpi xmlns:a14="http://schemas.microsoft.com/office/drawing/2010/main" val="0"/>
+              </a:ext>
+            </a:extLst>
+          </a:blip>
+          <a:srcRect/>
+          <a:stretch>
+            <a:fillRect/>
+          </a:stretch>
+        </p:blipFill>
+        <p:spPr bwMode="auto">
+          <a:xfrm rot="20434067">
+            <a:off x="10799770" y="1954360"/>
+            <a:ext cx="603393" cy="603393"/>
+          </a:xfrm>
+          <a:prstGeom prst="rect">
+            <a:avLst/>
+          </a:prstGeom>
+          <a:noFill/>
+          <a:extLst>
+            <a:ext uri="{909E8E84-426E-40DD-AFC4-6F175D3DCCD1}">
+              <a14:hiddenFill xmlns:a14="http://schemas.microsoft.com/office/drawing/2010/main">
+                <a:solidFill>
+                  <a:srgbClr val="FFFFFF"/>
+                </a:solidFill>
+              </a14:hiddenFill>
+            </a:ext>
+          </a:extLst>
+        </p:spPr>
+      </p:pic>
+      <p:pic>
+        <p:nvPicPr>
+          <p:cNvPr id="11" name="Picture 10">
+            <a:extLst>
+              <a:ext uri="{FF2B5EF4-FFF2-40B4-BE49-F238E27FC236}">
+                <a16:creationId xmlns:a16="http://schemas.microsoft.com/office/drawing/2014/main" id="{A501B6B5-7E1D-4802-B8B7-24C19D1C19BA}"/>
+              </a:ext>
+            </a:extLst>
+          </p:cNvPr>
+          <p:cNvPicPr>
+            <a:picLocks noChangeAspect="1"/>
+          </p:cNvPicPr>
+          <p:nvPr/>
+        </p:nvPicPr>
+        <p:blipFill>
+          <a:blip r:embed="rId3">
+            <a:extLst>
+              <a:ext uri="{28A0092B-C50C-407E-A947-70E740481C1C}">
+                <a14:useLocalDpi xmlns:a14="http://schemas.microsoft.com/office/drawing/2010/main" val="0"/>
+              </a:ext>
+            </a:extLst>
+          </a:blip>
+          <a:stretch>
+            <a:fillRect/>
+          </a:stretch>
+        </p:blipFill>
+        <p:spPr>
+          <a:xfrm flipH="1">
+            <a:off x="10599215" y="4438820"/>
+            <a:ext cx="999831" cy="859611"/>
+          </a:xfrm>
+          <a:prstGeom prst="rect">
+            <a:avLst/>
+          </a:prstGeom>
+        </p:spPr>
+      </p:pic>
+      <p:sp>
+        <p:nvSpPr>
+          <p:cNvPr id="12" name="Rectangle 11">
+            <a:extLst>
+              <a:ext uri="{FF2B5EF4-FFF2-40B4-BE49-F238E27FC236}">
+                <a16:creationId xmlns:a16="http://schemas.microsoft.com/office/drawing/2014/main" id="{086A888D-7AA2-4227-A176-A746E8E53526}"/>
+              </a:ext>
+            </a:extLst>
+          </p:cNvPr>
+          <p:cNvSpPr/>
+          <p:nvPr/>
+        </p:nvSpPr>
+        <p:spPr>
+          <a:xfrm rot="2768215" flipH="1">
+            <a:off x="917806" y="755474"/>
+            <a:ext cx="441146" cy="400110"/>
+          </a:xfrm>
+          <a:prstGeom prst="rect">
+            <a:avLst/>
+          </a:prstGeom>
+          <a:solidFill>
+            <a:schemeClr val="bg2">
+              <a:lumMod val="75000"/>
+            </a:schemeClr>
+          </a:solidFill>
+        </p:spPr>
+        <p:txBody>
+          <a:bodyPr wrap="square">
+            <a:spAutoFit/>
+          </a:bodyPr>
+          <a:lstStyle/>
+          <a:p>
+            <a:r>
+              <a:rPr lang="en-US" sz="2000" b="1" dirty="0">
+                <a:solidFill>
+                  <a:schemeClr val="bg1"/>
+                </a:solidFill>
+                <a:latin typeface="Font Awesome 5 Free Solid" panose="02000503000000000000" pitchFamily="50" charset="0"/>
+              </a:rPr>
+              <a:t></a:t>
+            </a:r>
+            <a:endParaRPr lang="en-US" sz="2000" dirty="0">
+              <a:solidFill>
+                <a:schemeClr val="bg1"/>
+              </a:solidFill>
+              <a:latin typeface="Font Awesome 5 Free Solid" panose="02000503000000000000" pitchFamily="50" charset="0"/>
+            </a:endParaRPr>
+          </a:p>
+        </p:txBody>
+      </p:sp>
+      <p:cxnSp>
+        <p:nvCxnSpPr>
+          <p:cNvPr id="13" name="Straight Arrow Connector 12">
+            <a:extLst>
+              <a:ext uri="{FF2B5EF4-FFF2-40B4-BE49-F238E27FC236}">
+                <a16:creationId xmlns:a16="http://schemas.microsoft.com/office/drawing/2014/main" id="{B3DD4703-FD43-46E7-B7F5-5B9FA8966118}"/>
+              </a:ext>
+            </a:extLst>
+          </p:cNvPr>
+          <p:cNvCxnSpPr/>
+          <p:nvPr/>
+        </p:nvCxnSpPr>
+        <p:spPr>
+          <a:xfrm>
+            <a:off x="5035680" y="4973206"/>
+            <a:ext cx="1417538" cy="0"/>
+          </a:xfrm>
+          <a:prstGeom prst="straightConnector1">
+            <a:avLst/>
+          </a:prstGeom>
+          <a:ln>
+            <a:solidFill>
+              <a:schemeClr val="tx1">
+                <a:lumMod val="50000"/>
+                <a:lumOff val="50000"/>
+              </a:schemeClr>
+            </a:solidFill>
+            <a:tailEnd type="triangle"/>
+          </a:ln>
+        </p:spPr>
+        <p:style>
+          <a:lnRef idx="1">
+            <a:schemeClr val="accent1"/>
+          </a:lnRef>
+          <a:fillRef idx="0">
+            <a:schemeClr val="accent1"/>
+          </a:fillRef>
+          <a:effectRef idx="0">
+            <a:schemeClr val="accent1"/>
+          </a:effectRef>
+          <a:fontRef idx="minor">
+            <a:schemeClr val="tx1"/>
+          </a:fontRef>
+        </p:style>
+      </p:cxnSp>
+      <p:cxnSp>
+        <p:nvCxnSpPr>
+          <p:cNvPr id="15" name="Straight Arrow Connector 14">
+            <a:extLst>
+              <a:ext uri="{FF2B5EF4-FFF2-40B4-BE49-F238E27FC236}">
+                <a16:creationId xmlns:a16="http://schemas.microsoft.com/office/drawing/2014/main" id="{7BE6D72B-D787-490A-8911-BF0CC2B290CD}"/>
+              </a:ext>
+            </a:extLst>
+          </p:cNvPr>
+          <p:cNvCxnSpPr>
+            <a:cxnSpLocks/>
+          </p:cNvCxnSpPr>
+          <p:nvPr/>
+        </p:nvCxnSpPr>
+        <p:spPr>
+          <a:xfrm>
+            <a:off x="8240201" y="4973206"/>
+            <a:ext cx="2119954" cy="0"/>
+          </a:xfrm>
+          <a:prstGeom prst="straightConnector1">
+            <a:avLst/>
+          </a:prstGeom>
+          <a:ln>
+            <a:solidFill>
+              <a:schemeClr val="tx1">
+                <a:lumMod val="50000"/>
+                <a:lumOff val="50000"/>
+              </a:schemeClr>
+            </a:solidFill>
+            <a:tailEnd type="triangle"/>
+          </a:ln>
+        </p:spPr>
+        <p:style>
+          <a:lnRef idx="1">
+            <a:schemeClr val="accent1"/>
+          </a:lnRef>
+          <a:fillRef idx="0">
+            <a:schemeClr val="accent1"/>
+          </a:fillRef>
+          <a:effectRef idx="0">
+            <a:schemeClr val="accent1"/>
+          </a:effectRef>
+          <a:fontRef idx="minor">
+            <a:schemeClr val="tx1"/>
+          </a:fontRef>
+        </p:style>
+      </p:cxnSp>
+      <p:sp>
+        <p:nvSpPr>
+          <p:cNvPr id="22" name="TextBox 21">
+            <a:extLst>
+              <a:ext uri="{FF2B5EF4-FFF2-40B4-BE49-F238E27FC236}">
+                <a16:creationId xmlns:a16="http://schemas.microsoft.com/office/drawing/2014/main" id="{914EF896-AF7A-4DA4-AD95-634FB8B36794}"/>
+              </a:ext>
+            </a:extLst>
+          </p:cNvPr>
+          <p:cNvSpPr txBox="1"/>
+          <p:nvPr/>
+        </p:nvSpPr>
+        <p:spPr>
+          <a:xfrm>
+            <a:off x="4168905" y="6249828"/>
+            <a:ext cx="1162050" cy="369332"/>
+          </a:xfrm>
+          <a:prstGeom prst="rect">
+            <a:avLst/>
+          </a:prstGeom>
+          <a:noFill/>
+        </p:spPr>
+        <p:txBody>
+          <a:bodyPr wrap="square" rtlCol="0">
+            <a:spAutoFit/>
+          </a:bodyPr>
+          <a:lstStyle/>
+          <a:p>
+            <a:r>
+              <a:rPr lang="en-US" dirty="0"/>
+              <a:t>Users</a:t>
+            </a:r>
+          </a:p>
+        </p:txBody>
+      </p:sp>
+      <p:sp>
+        <p:nvSpPr>
+          <p:cNvPr id="23" name="TextBox 22">
+            <a:extLst>
+              <a:ext uri="{FF2B5EF4-FFF2-40B4-BE49-F238E27FC236}">
+                <a16:creationId xmlns:a16="http://schemas.microsoft.com/office/drawing/2014/main" id="{93FDEA5A-A025-4B66-BD39-54BA53322C66}"/>
+              </a:ext>
+            </a:extLst>
+          </p:cNvPr>
+          <p:cNvSpPr txBox="1"/>
+          <p:nvPr/>
+        </p:nvSpPr>
+        <p:spPr>
+          <a:xfrm>
+            <a:off x="7140617" y="6278396"/>
+            <a:ext cx="1162050" cy="369332"/>
+          </a:xfrm>
+          <a:prstGeom prst="rect">
+            <a:avLst/>
+          </a:prstGeom>
+          <a:noFill/>
+        </p:spPr>
+        <p:txBody>
+          <a:bodyPr wrap="square" rtlCol="0">
+            <a:spAutoFit/>
+          </a:bodyPr>
+          <a:lstStyle/>
+          <a:p>
+            <a:r>
+              <a:rPr lang="en-US" dirty="0"/>
+              <a:t>Clients</a:t>
+            </a:r>
+          </a:p>
+        </p:txBody>
+      </p:sp>
+      <p:sp>
+        <p:nvSpPr>
+          <p:cNvPr id="24" name="TextBox 23">
+            <a:extLst>
+              <a:ext uri="{FF2B5EF4-FFF2-40B4-BE49-F238E27FC236}">
+                <a16:creationId xmlns:a16="http://schemas.microsoft.com/office/drawing/2014/main" id="{277B1F78-1CDE-4C63-A314-D0CB8FB668FD}"/>
+              </a:ext>
+            </a:extLst>
+          </p:cNvPr>
+          <p:cNvSpPr txBox="1"/>
+          <p:nvPr/>
+        </p:nvSpPr>
+        <p:spPr>
+          <a:xfrm>
+            <a:off x="10409125" y="6249828"/>
+            <a:ext cx="1162050" cy="369332"/>
+          </a:xfrm>
+          <a:prstGeom prst="rect">
+            <a:avLst/>
+          </a:prstGeom>
+          <a:noFill/>
+        </p:spPr>
+        <p:txBody>
+          <a:bodyPr wrap="square" rtlCol="0">
+            <a:spAutoFit/>
+          </a:bodyPr>
+          <a:lstStyle/>
+          <a:p>
+            <a:r>
+              <a:rPr lang="en-US" dirty="0"/>
+              <a:t>Resources</a:t>
+            </a:r>
+          </a:p>
+        </p:txBody>
+      </p:sp>
+      <p:sp>
+        <p:nvSpPr>
+          <p:cNvPr id="25" name="TextBox 24">
+            <a:extLst>
+              <a:ext uri="{FF2B5EF4-FFF2-40B4-BE49-F238E27FC236}">
+                <a16:creationId xmlns:a16="http://schemas.microsoft.com/office/drawing/2014/main" id="{270368DA-516B-4EE0-B743-05FBB438D20E}"/>
+              </a:ext>
+            </a:extLst>
+          </p:cNvPr>
+          <p:cNvSpPr txBox="1"/>
+          <p:nvPr/>
+        </p:nvSpPr>
+        <p:spPr>
+          <a:xfrm>
+            <a:off x="10672017" y="2600583"/>
+            <a:ext cx="1162050" cy="276999"/>
+          </a:xfrm>
+          <a:prstGeom prst="rect">
+            <a:avLst/>
+          </a:prstGeom>
+          <a:noFill/>
+        </p:spPr>
+        <p:txBody>
+          <a:bodyPr wrap="square" rtlCol="0">
+            <a:spAutoFit/>
+          </a:bodyPr>
+          <a:lstStyle/>
+          <a:p>
+            <a:r>
+              <a:rPr lang="en-US" sz="1200" dirty="0"/>
+              <a:t>Identity data</a:t>
+            </a:r>
+          </a:p>
+        </p:txBody>
+      </p:sp>
+      <p:sp>
+        <p:nvSpPr>
+          <p:cNvPr id="26" name="TextBox 25">
+            <a:extLst>
+              <a:ext uri="{FF2B5EF4-FFF2-40B4-BE49-F238E27FC236}">
+                <a16:creationId xmlns:a16="http://schemas.microsoft.com/office/drawing/2014/main" id="{1F5997C6-27EE-4CBB-A15A-9EB5AE7511FF}"/>
+              </a:ext>
+            </a:extLst>
+          </p:cNvPr>
+          <p:cNvSpPr txBox="1"/>
+          <p:nvPr/>
+        </p:nvSpPr>
+        <p:spPr>
+          <a:xfrm>
+            <a:off x="10634010" y="5258075"/>
+            <a:ext cx="1162050" cy="276999"/>
+          </a:xfrm>
+          <a:prstGeom prst="rect">
+            <a:avLst/>
+          </a:prstGeom>
+          <a:noFill/>
+        </p:spPr>
+        <p:txBody>
+          <a:bodyPr wrap="square" rtlCol="0">
+            <a:spAutoFit/>
+          </a:bodyPr>
+          <a:lstStyle/>
+          <a:p>
+            <a:pPr algn="ctr"/>
+            <a:r>
+              <a:rPr lang="en-US" sz="1200" dirty="0" err="1"/>
+              <a:t>Apis</a:t>
+            </a:r>
+            <a:endParaRPr lang="en-US" sz="1200" dirty="0"/>
+          </a:p>
+        </p:txBody>
+      </p:sp>
+      <p:sp>
+        <p:nvSpPr>
+          <p:cNvPr id="30" name="TextBox 29">
+            <a:extLst>
+              <a:ext uri="{FF2B5EF4-FFF2-40B4-BE49-F238E27FC236}">
+                <a16:creationId xmlns:a16="http://schemas.microsoft.com/office/drawing/2014/main" id="{318E3CA4-998D-4600-A93C-7C23A29D7ECD}"/>
+              </a:ext>
+            </a:extLst>
+          </p:cNvPr>
+          <p:cNvSpPr txBox="1"/>
+          <p:nvPr/>
+        </p:nvSpPr>
+        <p:spPr>
+          <a:xfrm>
+            <a:off x="216809" y="850479"/>
+            <a:ext cx="688170" cy="276999"/>
+          </a:xfrm>
+          <a:prstGeom prst="rect">
+            <a:avLst/>
+          </a:prstGeom>
+          <a:noFill/>
+        </p:spPr>
+        <p:txBody>
+          <a:bodyPr wrap="square" rtlCol="0">
+            <a:spAutoFit/>
+          </a:bodyPr>
+          <a:lstStyle/>
+          <a:p>
+            <a:r>
+              <a:rPr lang="en-US" sz="1200" dirty="0"/>
+              <a:t>ADFS</a:t>
+            </a:r>
+          </a:p>
+        </p:txBody>
+      </p:sp>
+      <p:sp>
+        <p:nvSpPr>
+          <p:cNvPr id="33" name="TextBox 32">
+            <a:extLst>
+              <a:ext uri="{FF2B5EF4-FFF2-40B4-BE49-F238E27FC236}">
+                <a16:creationId xmlns:a16="http://schemas.microsoft.com/office/drawing/2014/main" id="{58B40D14-CA55-40FA-BFE9-9119D092F17D}"/>
+              </a:ext>
+            </a:extLst>
+          </p:cNvPr>
+          <p:cNvSpPr txBox="1"/>
+          <p:nvPr/>
+        </p:nvSpPr>
+        <p:spPr>
+          <a:xfrm>
+            <a:off x="7602036" y="1515331"/>
+            <a:ext cx="1629440" cy="369332"/>
+          </a:xfrm>
+          <a:prstGeom prst="rect">
+            <a:avLst/>
+          </a:prstGeom>
+          <a:noFill/>
+        </p:spPr>
+        <p:txBody>
+          <a:bodyPr wrap="square" rtlCol="0">
+            <a:spAutoFit/>
+          </a:bodyPr>
+          <a:lstStyle/>
+          <a:p>
+            <a:r>
+              <a:rPr lang="en-US" dirty="0" err="1"/>
+              <a:t>IdentityServer</a:t>
+            </a:r>
+            <a:endParaRPr lang="en-US" dirty="0"/>
+          </a:p>
+        </p:txBody>
+      </p:sp>
+      <p:sp>
+        <p:nvSpPr>
+          <p:cNvPr id="55" name="Oval 54">
+            <a:extLst>
+              <a:ext uri="{FF2B5EF4-FFF2-40B4-BE49-F238E27FC236}">
+                <a16:creationId xmlns:a16="http://schemas.microsoft.com/office/drawing/2014/main" id="{2346B425-1FBC-464C-B147-770AE96E6E57}"/>
+              </a:ext>
+            </a:extLst>
+          </p:cNvPr>
+          <p:cNvSpPr/>
+          <p:nvPr/>
+        </p:nvSpPr>
+        <p:spPr>
+          <a:xfrm>
+            <a:off x="6573904" y="3134965"/>
+            <a:ext cx="239047" cy="241085"/>
+          </a:xfrm>
+          <a:prstGeom prst="ellipse">
+            <a:avLst/>
+          </a:prstGeom>
+          <a:solidFill>
+            <a:schemeClr val="tx1">
+              <a:lumMod val="65000"/>
+              <a:lumOff val="35000"/>
+            </a:schemeClr>
+          </a:solidFill>
+        </p:spPr>
+        <p:style>
+          <a:lnRef idx="2">
+            <a:schemeClr val="accent1">
+              <a:shade val="50000"/>
+            </a:schemeClr>
+          </a:lnRef>
+          <a:fillRef idx="1">
+            <a:schemeClr val="accent1"/>
+          </a:fillRef>
+          <a:effectRef idx="0">
+            <a:schemeClr val="accent1"/>
+          </a:effectRef>
+          <a:fontRef idx="minor">
+            <a:schemeClr val="lt1"/>
+          </a:fontRef>
+        </p:style>
+        <p:txBody>
+          <a:bodyPr rtlCol="0" anchor="ctr"/>
+          <a:lstStyle/>
+          <a:p>
+            <a:pPr algn="ctr"/>
+            <a:r>
+              <a:rPr lang="en-US" sz="1100" dirty="0"/>
+              <a:t>6</a:t>
+            </a:r>
+          </a:p>
+        </p:txBody>
+      </p:sp>
+      <p:sp>
+        <p:nvSpPr>
+          <p:cNvPr id="60" name="Oval 59">
+            <a:extLst>
+              <a:ext uri="{FF2B5EF4-FFF2-40B4-BE49-F238E27FC236}">
+                <a16:creationId xmlns:a16="http://schemas.microsoft.com/office/drawing/2014/main" id="{E9741A95-A957-4627-B305-776A9A99F54C}"/>
+              </a:ext>
+            </a:extLst>
+          </p:cNvPr>
+          <p:cNvSpPr/>
+          <p:nvPr/>
+        </p:nvSpPr>
+        <p:spPr>
+          <a:xfrm>
+            <a:off x="5485605" y="4831162"/>
+            <a:ext cx="256032" cy="256390"/>
+          </a:xfrm>
+          <a:prstGeom prst="ellipse">
+            <a:avLst/>
+          </a:prstGeom>
+          <a:solidFill>
+            <a:schemeClr val="tx1">
+              <a:lumMod val="65000"/>
+              <a:lumOff val="35000"/>
+            </a:schemeClr>
+          </a:solidFill>
+        </p:spPr>
+        <p:style>
+          <a:lnRef idx="2">
+            <a:schemeClr val="accent1">
+              <a:shade val="50000"/>
+            </a:schemeClr>
+          </a:lnRef>
+          <a:fillRef idx="1">
+            <a:schemeClr val="accent1"/>
+          </a:fillRef>
+          <a:effectRef idx="0">
+            <a:schemeClr val="accent1"/>
+          </a:effectRef>
+          <a:fontRef idx="minor">
+            <a:schemeClr val="lt1"/>
+          </a:fontRef>
+        </p:style>
+        <p:txBody>
+          <a:bodyPr rtlCol="0" anchor="ctr"/>
+          <a:lstStyle/>
+          <a:p>
+            <a:pPr algn="ctr"/>
+            <a:r>
+              <a:rPr lang="en-US" sz="1100" dirty="0"/>
+              <a:t>1</a:t>
+            </a:r>
+          </a:p>
+        </p:txBody>
+      </p:sp>
+      <p:sp>
+        <p:nvSpPr>
+          <p:cNvPr id="46" name="Oval 45">
+            <a:extLst>
+              <a:ext uri="{FF2B5EF4-FFF2-40B4-BE49-F238E27FC236}">
+                <a16:creationId xmlns:a16="http://schemas.microsoft.com/office/drawing/2014/main" id="{6A938FC1-5C48-4638-ACE4-B634AE0657E1}"/>
+              </a:ext>
+            </a:extLst>
+          </p:cNvPr>
+          <p:cNvSpPr/>
+          <p:nvPr/>
+        </p:nvSpPr>
+        <p:spPr>
+          <a:xfrm>
+            <a:off x="4005981" y="797915"/>
+            <a:ext cx="256032" cy="256390"/>
+          </a:xfrm>
+          <a:prstGeom prst="ellipse">
+            <a:avLst/>
+          </a:prstGeom>
+          <a:solidFill>
+            <a:schemeClr val="tx1">
+              <a:lumMod val="65000"/>
+              <a:lumOff val="35000"/>
+            </a:schemeClr>
+          </a:solidFill>
+        </p:spPr>
+        <p:style>
+          <a:lnRef idx="2">
+            <a:schemeClr val="accent1">
+              <a:shade val="50000"/>
+            </a:schemeClr>
+          </a:lnRef>
+          <a:fillRef idx="1">
+            <a:schemeClr val="accent1"/>
+          </a:fillRef>
+          <a:effectRef idx="0">
+            <a:schemeClr val="accent1"/>
+          </a:effectRef>
+          <a:fontRef idx="minor">
+            <a:schemeClr val="lt1"/>
+          </a:fontRef>
+        </p:style>
+        <p:txBody>
+          <a:bodyPr rtlCol="0" anchor="ctr"/>
+          <a:lstStyle/>
+          <a:p>
+            <a:pPr algn="ctr"/>
+            <a:r>
+              <a:rPr lang="en-US" sz="1100" dirty="0"/>
+              <a:t>3</a:t>
+            </a:r>
+          </a:p>
+        </p:txBody>
+      </p:sp>
+      <p:sp>
+        <p:nvSpPr>
+          <p:cNvPr id="49" name="Oval 48">
+            <a:extLst>
+              <a:ext uri="{FF2B5EF4-FFF2-40B4-BE49-F238E27FC236}">
+                <a16:creationId xmlns:a16="http://schemas.microsoft.com/office/drawing/2014/main" id="{FAF511DE-B052-4D0A-8525-D838F920D01A}"/>
+              </a:ext>
+            </a:extLst>
+          </p:cNvPr>
+          <p:cNvSpPr/>
+          <p:nvPr/>
+        </p:nvSpPr>
+        <p:spPr>
+          <a:xfrm>
+            <a:off x="4635401" y="1606444"/>
+            <a:ext cx="256032" cy="256390"/>
+          </a:xfrm>
+          <a:prstGeom prst="ellipse">
+            <a:avLst/>
+          </a:prstGeom>
+          <a:solidFill>
+            <a:schemeClr val="tx1">
+              <a:lumMod val="65000"/>
+              <a:lumOff val="35000"/>
+            </a:schemeClr>
+          </a:solidFill>
+        </p:spPr>
+        <p:style>
+          <a:lnRef idx="2">
+            <a:schemeClr val="accent1">
+              <a:shade val="50000"/>
+            </a:schemeClr>
+          </a:lnRef>
+          <a:fillRef idx="1">
+            <a:schemeClr val="accent1"/>
+          </a:fillRef>
+          <a:effectRef idx="0">
+            <a:schemeClr val="accent1"/>
+          </a:effectRef>
+          <a:fontRef idx="minor">
+            <a:schemeClr val="lt1"/>
+          </a:fontRef>
+        </p:style>
+        <p:txBody>
+          <a:bodyPr rtlCol="0" anchor="ctr"/>
+          <a:lstStyle/>
+          <a:p>
+            <a:pPr algn="ctr"/>
+            <a:r>
+              <a:rPr lang="en-US" sz="1100" dirty="0"/>
+              <a:t>4</a:t>
+            </a:r>
+          </a:p>
+        </p:txBody>
+      </p:sp>
+      <p:sp>
+        <p:nvSpPr>
+          <p:cNvPr id="35" name="Oval 34">
+            <a:extLst>
+              <a:ext uri="{FF2B5EF4-FFF2-40B4-BE49-F238E27FC236}">
+                <a16:creationId xmlns:a16="http://schemas.microsoft.com/office/drawing/2014/main" id="{3C73F3C9-DC4C-4BDE-B05A-8B75DEF66A29}"/>
+              </a:ext>
+            </a:extLst>
+          </p:cNvPr>
+          <p:cNvSpPr/>
+          <p:nvPr/>
+        </p:nvSpPr>
+        <p:spPr>
+          <a:xfrm>
+            <a:off x="6267002" y="3699783"/>
+            <a:ext cx="256032" cy="256390"/>
+          </a:xfrm>
+          <a:prstGeom prst="ellipse">
+            <a:avLst/>
+          </a:prstGeom>
+          <a:solidFill>
+            <a:schemeClr val="tx1">
+              <a:lumMod val="65000"/>
+              <a:lumOff val="35000"/>
+            </a:schemeClr>
+          </a:solidFill>
+        </p:spPr>
+        <p:style>
+          <a:lnRef idx="2">
+            <a:schemeClr val="accent1">
+              <a:shade val="50000"/>
+            </a:schemeClr>
+          </a:lnRef>
+          <a:fillRef idx="1">
+            <a:schemeClr val="accent1"/>
+          </a:fillRef>
+          <a:effectRef idx="0">
+            <a:schemeClr val="accent1"/>
+          </a:effectRef>
+          <a:fontRef idx="minor">
+            <a:schemeClr val="lt1"/>
+          </a:fontRef>
+        </p:style>
+        <p:txBody>
+          <a:bodyPr rtlCol="0" anchor="ctr"/>
+          <a:lstStyle/>
+          <a:p>
+            <a:pPr algn="ctr"/>
+            <a:r>
+              <a:rPr lang="en-US" sz="1100" dirty="0"/>
+              <a:t>2</a:t>
+            </a:r>
+          </a:p>
+        </p:txBody>
+      </p:sp>
+      <p:sp>
+        <p:nvSpPr>
+          <p:cNvPr id="120" name="Oval 119">
+            <a:extLst>
+              <a:ext uri="{FF2B5EF4-FFF2-40B4-BE49-F238E27FC236}">
+                <a16:creationId xmlns:a16="http://schemas.microsoft.com/office/drawing/2014/main" id="{46FBC2DB-BCE2-4790-B504-E60EEFE10469}"/>
+              </a:ext>
+            </a:extLst>
+          </p:cNvPr>
+          <p:cNvSpPr/>
+          <p:nvPr/>
+        </p:nvSpPr>
+        <p:spPr>
+          <a:xfrm>
+            <a:off x="6968002" y="3423342"/>
+            <a:ext cx="237744" cy="237744"/>
+          </a:xfrm>
+          <a:prstGeom prst="ellipse">
+            <a:avLst/>
+          </a:prstGeom>
+          <a:solidFill>
+            <a:schemeClr val="tx1">
+              <a:lumMod val="65000"/>
+              <a:lumOff val="35000"/>
+            </a:schemeClr>
+          </a:solidFill>
+        </p:spPr>
+        <p:style>
+          <a:lnRef idx="2">
+            <a:schemeClr val="accent1">
+              <a:shade val="50000"/>
+            </a:schemeClr>
+          </a:lnRef>
+          <a:fillRef idx="1">
+            <a:schemeClr val="accent1"/>
+          </a:fillRef>
+          <a:effectRef idx="0">
+            <a:schemeClr val="accent1"/>
+          </a:effectRef>
+          <a:fontRef idx="minor">
+            <a:schemeClr val="lt1"/>
+          </a:fontRef>
+        </p:style>
+        <p:txBody>
+          <a:bodyPr rtlCol="0" anchor="ctr"/>
+          <a:lstStyle/>
+          <a:p>
+            <a:pPr algn="ctr"/>
+            <a:r>
+              <a:rPr lang="en-US" sz="1100" dirty="0"/>
+              <a:t>7</a:t>
+            </a:r>
+          </a:p>
+        </p:txBody>
+      </p:sp>
+      <p:sp>
+        <p:nvSpPr>
+          <p:cNvPr id="125" name="Oval 124">
+            <a:extLst>
+              <a:ext uri="{FF2B5EF4-FFF2-40B4-BE49-F238E27FC236}">
+                <a16:creationId xmlns:a16="http://schemas.microsoft.com/office/drawing/2014/main" id="{F59542DE-ACFA-42D8-B29C-4D74155637B8}"/>
+              </a:ext>
+            </a:extLst>
+          </p:cNvPr>
+          <p:cNvSpPr>
+            <a:spLocks noChangeAspect="1"/>
+          </p:cNvSpPr>
+          <p:nvPr/>
+        </p:nvSpPr>
+        <p:spPr>
+          <a:xfrm>
+            <a:off x="7319146" y="3126179"/>
+            <a:ext cx="255675" cy="256032"/>
+          </a:xfrm>
+          <a:prstGeom prst="ellipse">
+            <a:avLst/>
+          </a:prstGeom>
+          <a:solidFill>
+            <a:schemeClr val="tx1">
+              <a:lumMod val="65000"/>
+              <a:lumOff val="35000"/>
+            </a:schemeClr>
+          </a:solidFill>
+        </p:spPr>
+        <p:style>
+          <a:lnRef idx="2">
+            <a:schemeClr val="accent1">
+              <a:shade val="50000"/>
+            </a:schemeClr>
+          </a:lnRef>
+          <a:fillRef idx="1">
+            <a:schemeClr val="accent1"/>
+          </a:fillRef>
+          <a:effectRef idx="0">
+            <a:schemeClr val="accent1"/>
+          </a:effectRef>
+          <a:fontRef idx="minor">
+            <a:schemeClr val="lt1"/>
+          </a:fontRef>
+        </p:style>
+        <p:txBody>
+          <a:bodyPr lIns="0" tIns="0" rIns="0" bIns="0" rtlCol="0" anchor="ctr"/>
+          <a:lstStyle/>
+          <a:p>
+            <a:pPr algn="ctr"/>
+            <a:r>
+              <a:rPr lang="en-US" sz="1100" dirty="0"/>
+              <a:t>9</a:t>
+            </a:r>
+          </a:p>
+        </p:txBody>
+      </p:sp>
+      <p:graphicFrame>
+        <p:nvGraphicFramePr>
+          <p:cNvPr id="157" name="Table 157">
+            <a:extLst>
+              <a:ext uri="{FF2B5EF4-FFF2-40B4-BE49-F238E27FC236}">
+                <a16:creationId xmlns:a16="http://schemas.microsoft.com/office/drawing/2014/main" id="{586D0EF0-35DC-4B00-A8B6-7D40005EDEEF}"/>
+              </a:ext>
+            </a:extLst>
+          </p:cNvPr>
+          <p:cNvGraphicFramePr>
+            <a:graphicFrameLocks noGrp="1"/>
+          </p:cNvGraphicFramePr>
+          <p:nvPr>
+            <p:extLst>
+              <p:ext uri="{D42A27DB-BD31-4B8C-83A1-F6EECF244321}">
+                <p14:modId xmlns:p14="http://schemas.microsoft.com/office/powerpoint/2010/main" val="1568953853"/>
+              </p:ext>
+            </p:extLst>
+          </p:nvPr>
+        </p:nvGraphicFramePr>
+        <p:xfrm>
+          <a:off x="290166" y="1400116"/>
+          <a:ext cx="3705820" cy="5181600"/>
+        </p:xfrm>
+        <a:graphic>
+          <a:graphicData uri="http://schemas.openxmlformats.org/drawingml/2006/table">
+            <a:tbl>
+              <a:tblPr firstRow="1" bandRow="1">
+                <a:tableStyleId>{93296810-A885-4BE3-A3E7-6D5BEEA58F35}</a:tableStyleId>
+              </a:tblPr>
+              <a:tblGrid>
+                <a:gridCol w="566290">
+                  <a:extLst>
+                    <a:ext uri="{9D8B030D-6E8A-4147-A177-3AD203B41FA5}">
+                      <a16:colId xmlns:a16="http://schemas.microsoft.com/office/drawing/2014/main" val="3769977152"/>
+                    </a:ext>
+                  </a:extLst>
+                </a:gridCol>
+                <a:gridCol w="3139530">
+                  <a:extLst>
+                    <a:ext uri="{9D8B030D-6E8A-4147-A177-3AD203B41FA5}">
+                      <a16:colId xmlns:a16="http://schemas.microsoft.com/office/drawing/2014/main" val="1754320607"/>
+                    </a:ext>
+                  </a:extLst>
+                </a:gridCol>
+              </a:tblGrid>
+              <a:tr h="222358">
+                <a:tc>
+                  <a:txBody>
+                    <a:bodyPr/>
+                    <a:lstStyle/>
+                    <a:p>
+                      <a:pPr algn="ctr"/>
+                      <a:r>
+                        <a:rPr lang="en-US" sz="900" dirty="0"/>
+                        <a:t>Action</a:t>
+                      </a:r>
+                    </a:p>
+                  </a:txBody>
+                  <a:tcPr/>
+                </a:tc>
+                <a:tc>
+                  <a:txBody>
+                    <a:bodyPr/>
+                    <a:lstStyle/>
+                    <a:p>
+                      <a:pPr algn="ctr"/>
+                      <a:r>
+                        <a:rPr lang="en-US" sz="900" dirty="0"/>
+                        <a:t>Description</a:t>
+                      </a:r>
+                    </a:p>
+                  </a:txBody>
+                  <a:tcPr/>
+                </a:tc>
+                <a:extLst>
+                  <a:ext uri="{0D108BD9-81ED-4DB2-BD59-A6C34878D82A}">
+                    <a16:rowId xmlns:a16="http://schemas.microsoft.com/office/drawing/2014/main" val="369614627"/>
+                  </a:ext>
+                </a:extLst>
+              </a:tr>
+              <a:tr h="370840">
+                <a:tc>
+                  <a:txBody>
+                    <a:bodyPr/>
+                    <a:lstStyle/>
+                    <a:p>
+                      <a:pPr algn="ctr"/>
+                      <a:r>
+                        <a:rPr lang="en-US" sz="900" dirty="0"/>
+                        <a:t>1</a:t>
+                      </a:r>
+                    </a:p>
+                  </a:txBody>
+                  <a:tcPr/>
+                </a:tc>
+                <a:tc>
+                  <a:txBody>
+                    <a:bodyPr/>
+                    <a:lstStyle/>
+                    <a:p>
+                      <a:r>
+                        <a:rPr lang="en-US" sz="900" dirty="0"/>
+                        <a:t>User clicks a link to the access some protected resource data.</a:t>
+                      </a:r>
+                    </a:p>
+                  </a:txBody>
+                  <a:tcPr/>
+                </a:tc>
+                <a:extLst>
+                  <a:ext uri="{0D108BD9-81ED-4DB2-BD59-A6C34878D82A}">
+                    <a16:rowId xmlns:a16="http://schemas.microsoft.com/office/drawing/2014/main" val="3624917445"/>
+                  </a:ext>
+                </a:extLst>
+              </a:tr>
+              <a:tr h="370840">
+                <a:tc>
+                  <a:txBody>
+                    <a:bodyPr/>
+                    <a:lstStyle/>
+                    <a:p>
+                      <a:pPr algn="ctr"/>
+                      <a:r>
+                        <a:rPr lang="en-US" sz="900" dirty="0"/>
+                        <a:t>2</a:t>
+                      </a:r>
+                    </a:p>
+                  </a:txBody>
+                  <a:tcPr/>
+                </a:tc>
+                <a:tc>
+                  <a:txBody>
+                    <a:bodyPr/>
+                    <a:lstStyle/>
+                    <a:p>
+                      <a:pPr marL="0" marR="0" lvl="0" indent="0" algn="l" defTabSz="914400" rtl="0" eaLnBrk="1" fontAlgn="auto" latinLnBrk="0" hangingPunct="1">
+                        <a:lnSpc>
+                          <a:spcPct val="100000"/>
+                        </a:lnSpc>
+                        <a:spcBef>
+                          <a:spcPts val="0"/>
+                        </a:spcBef>
+                        <a:spcAft>
+                          <a:spcPts val="0"/>
+                        </a:spcAft>
+                        <a:buClrTx/>
+                        <a:buSzTx/>
+                        <a:buFontTx/>
+                        <a:buNone/>
+                        <a:tabLst/>
+                        <a:defRPr/>
+                      </a:pPr>
+                      <a:r>
+                        <a:rPr lang="en-US" sz="900" dirty="0"/>
+                        <a:t>Client sends authentication request to </a:t>
+                      </a:r>
+                      <a:r>
+                        <a:rPr lang="en-US" sz="900" dirty="0" err="1"/>
+                        <a:t>IdentityServer</a:t>
+                      </a:r>
+                      <a:r>
+                        <a:rPr lang="en-US" sz="900" dirty="0"/>
+                        <a:t>.</a:t>
+                      </a:r>
+                    </a:p>
+                  </a:txBody>
+                  <a:tcPr/>
+                </a:tc>
+                <a:extLst>
+                  <a:ext uri="{0D108BD9-81ED-4DB2-BD59-A6C34878D82A}">
+                    <a16:rowId xmlns:a16="http://schemas.microsoft.com/office/drawing/2014/main" val="224974563"/>
+                  </a:ext>
+                </a:extLst>
+              </a:tr>
+              <a:tr h="370840">
+                <a:tc>
+                  <a:txBody>
+                    <a:bodyPr/>
+                    <a:lstStyle/>
+                    <a:p>
+                      <a:pPr algn="ctr"/>
+                      <a:r>
+                        <a:rPr lang="en-US" sz="900" dirty="0"/>
+                        <a:t>3</a:t>
+                      </a:r>
+                    </a:p>
+                  </a:txBody>
+                  <a:tcPr/>
+                </a:tc>
+                <a:tc>
+                  <a:txBody>
+                    <a:bodyPr/>
+                    <a:lstStyle/>
+                    <a:p>
+                      <a:pPr marL="0" marR="0" lvl="0" indent="0" algn="l" defTabSz="914400" rtl="0" eaLnBrk="1" fontAlgn="auto" latinLnBrk="0" hangingPunct="1">
+                        <a:lnSpc>
+                          <a:spcPct val="100000"/>
+                        </a:lnSpc>
+                        <a:spcBef>
+                          <a:spcPts val="0"/>
+                        </a:spcBef>
+                        <a:spcAft>
+                          <a:spcPts val="0"/>
+                        </a:spcAft>
+                        <a:buClrTx/>
+                        <a:buSzTx/>
+                        <a:buFontTx/>
+                        <a:buNone/>
+                        <a:tabLst/>
+                        <a:defRPr/>
+                      </a:pPr>
+                      <a:r>
+                        <a:rPr lang="en-US" sz="900" dirty="0"/>
+                        <a:t>Prompt user to authenticate with external identity provider.</a:t>
+                      </a:r>
+                    </a:p>
+                  </a:txBody>
+                  <a:tcPr/>
+                </a:tc>
+                <a:extLst>
+                  <a:ext uri="{0D108BD9-81ED-4DB2-BD59-A6C34878D82A}">
+                    <a16:rowId xmlns:a16="http://schemas.microsoft.com/office/drawing/2014/main" val="1326349098"/>
+                  </a:ext>
+                </a:extLst>
+              </a:tr>
+              <a:tr h="370840">
+                <a:tc>
+                  <a:txBody>
+                    <a:bodyPr/>
+                    <a:lstStyle/>
+                    <a:p>
+                      <a:pPr algn="ctr"/>
+                      <a:r>
+                        <a:rPr lang="en-US" sz="900" dirty="0"/>
+                        <a:t>4</a:t>
+                      </a:r>
+                    </a:p>
+                  </a:txBody>
+                  <a:tcPr/>
+                </a:tc>
+                <a:tc>
+                  <a:txBody>
+                    <a:bodyPr/>
+                    <a:lstStyle/>
+                    <a:p>
+                      <a:pPr marL="0" marR="0" lvl="0" indent="0" algn="l" defTabSz="914400" rtl="0" eaLnBrk="1" fontAlgn="auto" latinLnBrk="0" hangingPunct="1">
+                        <a:lnSpc>
+                          <a:spcPct val="100000"/>
+                        </a:lnSpc>
+                        <a:spcBef>
+                          <a:spcPts val="0"/>
+                        </a:spcBef>
+                        <a:spcAft>
+                          <a:spcPts val="0"/>
+                        </a:spcAft>
+                        <a:buClrTx/>
+                        <a:buSzTx/>
+                        <a:buFontTx/>
+                        <a:buNone/>
+                        <a:tabLst/>
+                        <a:defRPr/>
+                      </a:pPr>
+                      <a:r>
+                        <a:rPr lang="en-US" sz="900" dirty="0"/>
+                        <a:t>Return SAML token from external provider back to </a:t>
+                      </a:r>
+                      <a:r>
+                        <a:rPr lang="en-US" sz="900" dirty="0" err="1"/>
+                        <a:t>IdentityServer</a:t>
+                      </a:r>
+                      <a:endParaRPr lang="en-US" sz="900" dirty="0"/>
+                    </a:p>
+                  </a:txBody>
+                  <a:tcPr/>
+                </a:tc>
+                <a:extLst>
+                  <a:ext uri="{0D108BD9-81ED-4DB2-BD59-A6C34878D82A}">
+                    <a16:rowId xmlns:a16="http://schemas.microsoft.com/office/drawing/2014/main" val="3967492325"/>
+                  </a:ext>
+                </a:extLst>
+              </a:tr>
+              <a:tr h="370840">
+                <a:tc>
+                  <a:txBody>
+                    <a:bodyPr/>
+                    <a:lstStyle/>
+                    <a:p>
+                      <a:pPr algn="ctr"/>
+                      <a:r>
+                        <a:rPr lang="en-US" sz="900" dirty="0"/>
+                        <a:t>5</a:t>
+                      </a:r>
+                    </a:p>
+                  </a:txBody>
+                  <a:tcPr/>
+                </a:tc>
+                <a:tc>
+                  <a:txBody>
+                    <a:bodyPr/>
+                    <a:lstStyle/>
+                    <a:p>
+                      <a:pPr marL="0" marR="0" lvl="0" indent="0" algn="l" defTabSz="914400" rtl="0" eaLnBrk="1" fontAlgn="auto" latinLnBrk="0" hangingPunct="1">
+                        <a:lnSpc>
+                          <a:spcPct val="100000"/>
+                        </a:lnSpc>
+                        <a:spcBef>
+                          <a:spcPts val="0"/>
+                        </a:spcBef>
+                        <a:spcAft>
+                          <a:spcPts val="0"/>
+                        </a:spcAft>
+                        <a:buClrTx/>
+                        <a:buSzTx/>
+                        <a:buFontTx/>
+                        <a:buNone/>
+                        <a:tabLst/>
+                        <a:defRPr/>
+                      </a:pPr>
+                      <a:r>
+                        <a:rPr lang="en-US" sz="900" dirty="0" err="1"/>
+                        <a:t>IdentityServer</a:t>
+                      </a:r>
+                      <a:r>
+                        <a:rPr lang="en-US" sz="900" dirty="0"/>
+                        <a:t> generates authorization code</a:t>
+                      </a:r>
+                    </a:p>
+                  </a:txBody>
+                  <a:tcPr/>
+                </a:tc>
+                <a:extLst>
+                  <a:ext uri="{0D108BD9-81ED-4DB2-BD59-A6C34878D82A}">
+                    <a16:rowId xmlns:a16="http://schemas.microsoft.com/office/drawing/2014/main" val="1738324792"/>
+                  </a:ext>
+                </a:extLst>
+              </a:tr>
+              <a:tr h="370840">
+                <a:tc>
+                  <a:txBody>
+                    <a:bodyPr/>
+                    <a:lstStyle/>
+                    <a:p>
+                      <a:pPr algn="ctr"/>
+                      <a:r>
+                        <a:rPr lang="en-US" sz="900" dirty="0"/>
+                        <a:t>6</a:t>
+                      </a:r>
+                    </a:p>
+                  </a:txBody>
+                  <a:tcPr/>
+                </a:tc>
+                <a:tc>
+                  <a:txBody>
+                    <a:bodyPr/>
+                    <a:lstStyle/>
+                    <a:p>
+                      <a:pPr marL="0" marR="0" lvl="0" indent="0" algn="l" defTabSz="914400" rtl="0" eaLnBrk="1" fontAlgn="auto" latinLnBrk="0" hangingPunct="1">
+                        <a:lnSpc>
+                          <a:spcPct val="100000"/>
+                        </a:lnSpc>
+                        <a:spcBef>
+                          <a:spcPts val="0"/>
+                        </a:spcBef>
+                        <a:spcAft>
+                          <a:spcPts val="0"/>
+                        </a:spcAft>
+                        <a:buClrTx/>
+                        <a:buSzTx/>
+                        <a:buFontTx/>
+                        <a:buNone/>
+                        <a:tabLst/>
+                        <a:defRPr/>
+                      </a:pPr>
+                      <a:r>
+                        <a:rPr lang="en-US" sz="900" dirty="0"/>
+                        <a:t>Return authorization code to Client.</a:t>
+                      </a:r>
+                    </a:p>
+                  </a:txBody>
+                  <a:tcPr/>
+                </a:tc>
+                <a:extLst>
+                  <a:ext uri="{0D108BD9-81ED-4DB2-BD59-A6C34878D82A}">
+                    <a16:rowId xmlns:a16="http://schemas.microsoft.com/office/drawing/2014/main" val="2453138760"/>
+                  </a:ext>
+                </a:extLst>
+              </a:tr>
+              <a:tr h="370840">
+                <a:tc>
+                  <a:txBody>
+                    <a:bodyPr/>
+                    <a:lstStyle/>
+                    <a:p>
+                      <a:pPr algn="ctr"/>
+                      <a:r>
+                        <a:rPr lang="en-US" sz="900" dirty="0"/>
+                        <a:t>7</a:t>
+                      </a:r>
+                    </a:p>
+                  </a:txBody>
+                  <a:tcPr/>
+                </a:tc>
+                <a:tc>
+                  <a:txBody>
+                    <a:bodyPr/>
+                    <a:lstStyle/>
+                    <a:p>
+                      <a:pPr marL="0" marR="0" lvl="0" indent="0" algn="l" defTabSz="914400" rtl="0" eaLnBrk="1" fontAlgn="auto" latinLnBrk="0" hangingPunct="1">
+                        <a:lnSpc>
+                          <a:spcPct val="100000"/>
+                        </a:lnSpc>
+                        <a:spcBef>
+                          <a:spcPts val="0"/>
+                        </a:spcBef>
+                        <a:spcAft>
+                          <a:spcPts val="0"/>
+                        </a:spcAft>
+                        <a:buClrTx/>
+                        <a:buSzTx/>
+                        <a:buFontTx/>
+                        <a:buNone/>
+                        <a:tabLst/>
+                        <a:defRPr/>
+                      </a:pPr>
+                      <a:r>
+                        <a:rPr lang="en-US" sz="900" dirty="0"/>
+                        <a:t>Client sends token request with the client assertion, client assertion method and issued </a:t>
+                      </a:r>
+                      <a:r>
+                        <a:rPr lang="en-US" sz="900" dirty="0" err="1"/>
+                        <a:t>IdentityServer</a:t>
+                      </a:r>
+                      <a:r>
+                        <a:rPr lang="en-US" sz="900" dirty="0"/>
+                        <a:t> authorization code.</a:t>
+                      </a:r>
+                    </a:p>
+                  </a:txBody>
+                  <a:tcPr/>
+                </a:tc>
+                <a:extLst>
+                  <a:ext uri="{0D108BD9-81ED-4DB2-BD59-A6C34878D82A}">
+                    <a16:rowId xmlns:a16="http://schemas.microsoft.com/office/drawing/2014/main" val="2850467249"/>
+                  </a:ext>
+                </a:extLst>
+              </a:tr>
+              <a:tr h="370840">
+                <a:tc>
+                  <a:txBody>
+                    <a:bodyPr/>
+                    <a:lstStyle/>
+                    <a:p>
+                      <a:pPr algn="ctr"/>
+                      <a:r>
+                        <a:rPr lang="en-US" sz="900" dirty="0"/>
+                        <a:t>8</a:t>
+                      </a:r>
+                    </a:p>
+                  </a:txBody>
+                  <a:tcPr/>
+                </a:tc>
+                <a:tc>
+                  <a:txBody>
+                    <a:bodyPr/>
+                    <a:lstStyle/>
+                    <a:p>
+                      <a:pPr marL="0" marR="0" lvl="0" indent="0" algn="l" defTabSz="914400" rtl="0" eaLnBrk="1" fontAlgn="auto" latinLnBrk="0" hangingPunct="1">
+                        <a:lnSpc>
+                          <a:spcPct val="100000"/>
+                        </a:lnSpc>
+                        <a:spcBef>
+                          <a:spcPts val="0"/>
+                        </a:spcBef>
+                        <a:spcAft>
+                          <a:spcPts val="0"/>
+                        </a:spcAft>
+                        <a:buClrTx/>
+                        <a:buSzTx/>
+                        <a:buFontTx/>
+                        <a:buNone/>
+                        <a:tabLst/>
+                        <a:defRPr/>
+                      </a:pPr>
+                      <a:r>
+                        <a:rPr lang="en-US" sz="900" dirty="0" err="1"/>
+                        <a:t>IdentityServer</a:t>
+                      </a:r>
+                      <a:r>
+                        <a:rPr lang="en-US" sz="900" dirty="0"/>
+                        <a:t> extracts authorization and compares  client assertion to confirm the client is the valid owner of the authorization code.</a:t>
+                      </a:r>
+                    </a:p>
+                  </a:txBody>
+                  <a:tcPr/>
+                </a:tc>
+                <a:extLst>
+                  <a:ext uri="{0D108BD9-81ED-4DB2-BD59-A6C34878D82A}">
+                    <a16:rowId xmlns:a16="http://schemas.microsoft.com/office/drawing/2014/main" val="2795742520"/>
+                  </a:ext>
+                </a:extLst>
+              </a:tr>
+              <a:tr h="370840">
+                <a:tc>
+                  <a:txBody>
+                    <a:bodyPr/>
+                    <a:lstStyle/>
+                    <a:p>
+                      <a:pPr algn="ctr"/>
+                      <a:r>
+                        <a:rPr lang="en-US" sz="900" dirty="0"/>
+                        <a:t>9</a:t>
+                      </a:r>
+                    </a:p>
+                  </a:txBody>
+                  <a:tcPr/>
+                </a:tc>
+                <a:tc>
+                  <a:txBody>
+                    <a:bodyPr/>
+                    <a:lstStyle/>
+                    <a:p>
+                      <a:pPr marL="0" marR="0" lvl="0" indent="0" algn="l" defTabSz="914400" rtl="0" eaLnBrk="1" fontAlgn="auto" latinLnBrk="0" hangingPunct="1">
+                        <a:lnSpc>
+                          <a:spcPct val="100000"/>
+                        </a:lnSpc>
+                        <a:spcBef>
+                          <a:spcPts val="0"/>
+                        </a:spcBef>
+                        <a:spcAft>
+                          <a:spcPts val="0"/>
+                        </a:spcAft>
+                        <a:buClrTx/>
+                        <a:buSzTx/>
+                        <a:buFontTx/>
+                        <a:buNone/>
+                        <a:tabLst/>
+                        <a:defRPr/>
+                      </a:pPr>
+                      <a:r>
+                        <a:rPr lang="en-US" sz="900" dirty="0"/>
+                        <a:t>Generates the </a:t>
+                      </a:r>
+                      <a:r>
+                        <a:rPr lang="en-US" sz="800" i="1" dirty="0" err="1">
+                          <a:latin typeface="Courier New" panose="02070309020205020404" pitchFamily="49" charset="0"/>
+                          <a:cs typeface="Courier New" panose="02070309020205020404" pitchFamily="49" charset="0"/>
+                        </a:rPr>
+                        <a:t>access_token</a:t>
+                      </a:r>
+                      <a:r>
+                        <a:rPr lang="en-US" sz="800" i="1" dirty="0">
+                          <a:latin typeface="Courier New" panose="02070309020205020404" pitchFamily="49" charset="0"/>
+                          <a:cs typeface="Courier New" panose="02070309020205020404" pitchFamily="49" charset="0"/>
+                        </a:rPr>
+                        <a:t> </a:t>
+                      </a:r>
+                      <a:r>
+                        <a:rPr lang="en-US" sz="900" dirty="0"/>
+                        <a:t>and sends to Client.</a:t>
+                      </a:r>
+                    </a:p>
+                  </a:txBody>
+                  <a:tcPr/>
+                </a:tc>
+                <a:extLst>
+                  <a:ext uri="{0D108BD9-81ED-4DB2-BD59-A6C34878D82A}">
+                    <a16:rowId xmlns:a16="http://schemas.microsoft.com/office/drawing/2014/main" val="1395620984"/>
+                  </a:ext>
+                </a:extLst>
+              </a:tr>
+              <a:tr h="370840">
+                <a:tc>
+                  <a:txBody>
+                    <a:bodyPr/>
+                    <a:lstStyle/>
+                    <a:p>
+                      <a:pPr algn="ctr"/>
+                      <a:r>
+                        <a:rPr lang="en-US" sz="900" dirty="0"/>
+                        <a:t>10</a:t>
+                      </a:r>
+                    </a:p>
+                  </a:txBody>
+                  <a:tcPr/>
+                </a:tc>
+                <a:tc>
+                  <a:txBody>
+                    <a:bodyPr/>
+                    <a:lstStyle/>
+                    <a:p>
+                      <a:pPr marL="0" marR="0" lvl="0" indent="0" algn="l" defTabSz="914400" rtl="0" eaLnBrk="1" fontAlgn="auto" latinLnBrk="0" hangingPunct="1">
+                        <a:lnSpc>
+                          <a:spcPct val="100000"/>
+                        </a:lnSpc>
+                        <a:spcBef>
+                          <a:spcPts val="0"/>
+                        </a:spcBef>
+                        <a:spcAft>
+                          <a:spcPts val="0"/>
+                        </a:spcAft>
+                        <a:buClrTx/>
+                        <a:buSzTx/>
+                        <a:buFontTx/>
+                        <a:buNone/>
+                        <a:tabLst/>
+                        <a:defRPr/>
+                      </a:pPr>
+                      <a:r>
+                        <a:rPr lang="en-US" sz="900" dirty="0"/>
+                        <a:t>Send request to get </a:t>
+                      </a:r>
+                      <a:r>
+                        <a:rPr lang="en-US" sz="800" i="1" dirty="0" err="1">
+                          <a:latin typeface="Courier New" panose="02070309020205020404" pitchFamily="49" charset="0"/>
+                          <a:cs typeface="Courier New" panose="02070309020205020404" pitchFamily="49" charset="0"/>
+                        </a:rPr>
+                        <a:t>id_token</a:t>
+                      </a:r>
+                      <a:r>
+                        <a:rPr lang="en-US" sz="800" i="1" dirty="0">
+                          <a:latin typeface="Courier New" panose="02070309020205020404" pitchFamily="49" charset="0"/>
+                          <a:cs typeface="Courier New" panose="02070309020205020404" pitchFamily="49" charset="0"/>
+                        </a:rPr>
+                        <a:t> </a:t>
+                      </a:r>
+                      <a:r>
+                        <a:rPr lang="en-US" sz="900" dirty="0"/>
+                        <a:t>with </a:t>
+                      </a:r>
+                      <a:r>
+                        <a:rPr lang="en-US" sz="800" i="1" dirty="0" err="1">
+                          <a:latin typeface="Courier New" panose="02070309020205020404" pitchFamily="49" charset="0"/>
+                          <a:cs typeface="Courier New" panose="02070309020205020404" pitchFamily="49" charset="0"/>
+                        </a:rPr>
+                        <a:t>access_token</a:t>
+                      </a:r>
+                      <a:r>
+                        <a:rPr lang="en-US" sz="800" i="1" dirty="0">
+                          <a:latin typeface="Courier New" panose="02070309020205020404" pitchFamily="49" charset="0"/>
+                          <a:cs typeface="Courier New" panose="02070309020205020404" pitchFamily="49" charset="0"/>
+                        </a:rPr>
+                        <a:t> </a:t>
+                      </a:r>
+                      <a:r>
+                        <a:rPr lang="en-US" sz="900" dirty="0"/>
+                        <a:t>as bearer in the header request. </a:t>
+                      </a:r>
+                    </a:p>
+                  </a:txBody>
+                  <a:tcPr/>
+                </a:tc>
+                <a:extLst>
+                  <a:ext uri="{0D108BD9-81ED-4DB2-BD59-A6C34878D82A}">
+                    <a16:rowId xmlns:a16="http://schemas.microsoft.com/office/drawing/2014/main" val="1207935044"/>
+                  </a:ext>
+                </a:extLst>
+              </a:tr>
+              <a:tr h="370840">
+                <a:tc>
+                  <a:txBody>
+                    <a:bodyPr/>
+                    <a:lstStyle/>
+                    <a:p>
+                      <a:pPr algn="ctr"/>
+                      <a:r>
+                        <a:rPr lang="en-US" sz="900" dirty="0"/>
+                        <a:t>11</a:t>
+                      </a:r>
+                    </a:p>
+                  </a:txBody>
+                  <a:tcPr/>
+                </a:tc>
+                <a:tc>
+                  <a:txBody>
+                    <a:bodyPr/>
+                    <a:lstStyle/>
+                    <a:p>
+                      <a:pPr marL="0" marR="0" lvl="0" indent="0" algn="l" defTabSz="914400" rtl="0" eaLnBrk="1" fontAlgn="auto" latinLnBrk="0" hangingPunct="1">
+                        <a:lnSpc>
+                          <a:spcPct val="100000"/>
+                        </a:lnSpc>
+                        <a:spcBef>
+                          <a:spcPts val="0"/>
+                        </a:spcBef>
+                        <a:spcAft>
+                          <a:spcPts val="0"/>
+                        </a:spcAft>
+                        <a:buClrTx/>
+                        <a:buSzTx/>
+                        <a:buFontTx/>
+                        <a:buNone/>
+                        <a:tabLst/>
+                        <a:defRPr/>
+                      </a:pPr>
+                      <a:r>
+                        <a:rPr lang="en-US" sz="900" dirty="0"/>
+                        <a:t>Gets the identity data client requested (e.g. </a:t>
+                      </a:r>
+                      <a:r>
+                        <a:rPr lang="en-US" sz="800" i="1" dirty="0" err="1">
+                          <a:latin typeface="Courier New" panose="02070309020205020404" pitchFamily="49" charset="0"/>
+                          <a:cs typeface="Courier New" panose="02070309020205020404" pitchFamily="49" charset="0"/>
+                        </a:rPr>
+                        <a:t>openid</a:t>
+                      </a:r>
+                      <a:r>
+                        <a:rPr lang="en-US" sz="800" i="1" dirty="0">
+                          <a:latin typeface="Courier New" panose="02070309020205020404" pitchFamily="49" charset="0"/>
+                          <a:cs typeface="Courier New" panose="02070309020205020404" pitchFamily="49" charset="0"/>
+                        </a:rPr>
+                        <a:t>, profile</a:t>
+                      </a:r>
+                      <a:r>
+                        <a:rPr lang="en-US" sz="900" dirty="0"/>
+                        <a:t>, …etc.) </a:t>
+                      </a:r>
+                    </a:p>
+                  </a:txBody>
+                  <a:tcPr/>
+                </a:tc>
+                <a:extLst>
+                  <a:ext uri="{0D108BD9-81ED-4DB2-BD59-A6C34878D82A}">
+                    <a16:rowId xmlns:a16="http://schemas.microsoft.com/office/drawing/2014/main" val="1043760965"/>
+                  </a:ext>
+                </a:extLst>
+              </a:tr>
+              <a:tr h="370840">
+                <a:tc>
+                  <a:txBody>
+                    <a:bodyPr/>
+                    <a:lstStyle/>
+                    <a:p>
+                      <a:pPr algn="ctr"/>
+                      <a:r>
+                        <a:rPr lang="en-US" sz="900" dirty="0"/>
+                        <a:t>12</a:t>
+                      </a:r>
+                    </a:p>
+                  </a:txBody>
+                  <a:tcPr/>
+                </a:tc>
+                <a:tc>
+                  <a:txBody>
+                    <a:bodyPr/>
+                    <a:lstStyle/>
+                    <a:p>
+                      <a:pPr marL="0" marR="0" lvl="0" indent="0" algn="l" defTabSz="914400" rtl="0" eaLnBrk="1" fontAlgn="auto" latinLnBrk="0" hangingPunct="1">
+                        <a:lnSpc>
+                          <a:spcPct val="100000"/>
+                        </a:lnSpc>
+                        <a:spcBef>
+                          <a:spcPts val="0"/>
+                        </a:spcBef>
+                        <a:spcAft>
+                          <a:spcPts val="0"/>
+                        </a:spcAft>
+                        <a:buClrTx/>
+                        <a:buSzTx/>
+                        <a:buFontTx/>
+                        <a:buNone/>
+                        <a:tabLst/>
+                        <a:defRPr/>
+                      </a:pPr>
+                      <a:r>
+                        <a:rPr lang="en-US" sz="900" dirty="0" err="1"/>
+                        <a:t>IdentityServer</a:t>
+                      </a:r>
+                      <a:r>
+                        <a:rPr lang="en-US" sz="900" dirty="0"/>
+                        <a:t> sends the Client the </a:t>
+                      </a:r>
+                      <a:r>
+                        <a:rPr lang="en-US" sz="800" i="1" dirty="0" err="1">
+                          <a:latin typeface="Courier New" panose="02070309020205020404" pitchFamily="49" charset="0"/>
+                          <a:cs typeface="Courier New" panose="02070309020205020404" pitchFamily="49" charset="0"/>
+                        </a:rPr>
+                        <a:t>id_token</a:t>
+                      </a:r>
+                      <a:r>
+                        <a:rPr lang="en-US" sz="800" i="1" dirty="0">
+                          <a:latin typeface="Courier New" panose="02070309020205020404" pitchFamily="49" charset="0"/>
+                          <a:cs typeface="Courier New" panose="02070309020205020404" pitchFamily="49" charset="0"/>
+                        </a:rPr>
+                        <a:t> </a:t>
+                      </a:r>
+                      <a:r>
+                        <a:rPr lang="en-US" sz="900" dirty="0"/>
+                        <a:t>which can be exposed in the </a:t>
+                      </a:r>
+                      <a:r>
+                        <a:rPr lang="en-US" sz="900" dirty="0" err="1"/>
+                        <a:t>url</a:t>
+                      </a:r>
+                      <a:r>
+                        <a:rPr lang="en-US" sz="900" dirty="0"/>
+                        <a:t> since it is a GET request</a:t>
+                      </a:r>
+                    </a:p>
+                  </a:txBody>
+                  <a:tcPr/>
+                </a:tc>
+                <a:extLst>
+                  <a:ext uri="{0D108BD9-81ED-4DB2-BD59-A6C34878D82A}">
+                    <a16:rowId xmlns:a16="http://schemas.microsoft.com/office/drawing/2014/main" val="3577044800"/>
+                  </a:ext>
+                </a:extLst>
+              </a:tr>
+              <a:tr h="370840">
+                <a:tc>
+                  <a:txBody>
+                    <a:bodyPr/>
+                    <a:lstStyle/>
+                    <a:p>
+                      <a:pPr algn="ctr"/>
+                      <a:r>
+                        <a:rPr lang="en-US" sz="900" dirty="0"/>
+                        <a:t>13</a:t>
+                      </a:r>
+                    </a:p>
+                  </a:txBody>
+                  <a:tcPr/>
+                </a:tc>
+                <a:tc>
+                  <a:txBody>
+                    <a:bodyPr/>
+                    <a:lstStyle/>
+                    <a:p>
+                      <a:pPr marL="0" marR="0" lvl="0" indent="0" algn="l" defTabSz="914400" rtl="0" eaLnBrk="1" fontAlgn="auto" latinLnBrk="0" hangingPunct="1">
+                        <a:lnSpc>
+                          <a:spcPct val="100000"/>
+                        </a:lnSpc>
+                        <a:spcBef>
+                          <a:spcPts val="0"/>
+                        </a:spcBef>
+                        <a:spcAft>
+                          <a:spcPts val="0"/>
+                        </a:spcAft>
+                        <a:buClrTx/>
+                        <a:buSzTx/>
+                        <a:buFontTx/>
+                        <a:buNone/>
+                        <a:tabLst/>
+                        <a:defRPr/>
+                      </a:pPr>
+                      <a:r>
+                        <a:rPr lang="en-US" sz="900" dirty="0"/>
+                        <a:t>Client access the </a:t>
+                      </a:r>
+                      <a:r>
+                        <a:rPr lang="en-US" sz="900" dirty="0" err="1"/>
+                        <a:t>Api</a:t>
+                      </a:r>
+                      <a:r>
+                        <a:rPr lang="en-US" sz="900" dirty="0"/>
+                        <a:t> using the </a:t>
+                      </a:r>
+                      <a:r>
+                        <a:rPr lang="en-US" sz="800" i="1" dirty="0" err="1">
+                          <a:latin typeface="Courier New" panose="02070309020205020404" pitchFamily="49" charset="0"/>
+                          <a:cs typeface="Courier New" panose="02070309020205020404" pitchFamily="49" charset="0"/>
+                        </a:rPr>
+                        <a:t>access_token</a:t>
+                      </a:r>
+                      <a:r>
+                        <a:rPr lang="en-US" sz="800" i="1" dirty="0">
+                          <a:latin typeface="Courier New" panose="02070309020205020404" pitchFamily="49" charset="0"/>
+                          <a:cs typeface="Courier New" panose="02070309020205020404" pitchFamily="49" charset="0"/>
+                        </a:rPr>
+                        <a:t> </a:t>
+                      </a:r>
+                      <a:r>
+                        <a:rPr lang="en-US" sz="900" dirty="0"/>
+                        <a:t>as a bearer token in the authorize header.</a:t>
+                      </a:r>
+                    </a:p>
+                  </a:txBody>
+                  <a:tcPr/>
+                </a:tc>
+                <a:extLst>
+                  <a:ext uri="{0D108BD9-81ED-4DB2-BD59-A6C34878D82A}">
+                    <a16:rowId xmlns:a16="http://schemas.microsoft.com/office/drawing/2014/main" val="562681547"/>
+                  </a:ext>
+                </a:extLst>
+              </a:tr>
+            </a:tbl>
+          </a:graphicData>
+        </a:graphic>
+      </p:graphicFrame>
+      <p:cxnSp>
+        <p:nvCxnSpPr>
+          <p:cNvPr id="160" name="Connector: Elbow 159">
+            <a:extLst>
+              <a:ext uri="{FF2B5EF4-FFF2-40B4-BE49-F238E27FC236}">
+                <a16:creationId xmlns:a16="http://schemas.microsoft.com/office/drawing/2014/main" id="{C371F9A9-8464-49EA-9410-4DAFC0BC9C59}"/>
+              </a:ext>
+            </a:extLst>
+          </p:cNvPr>
+          <p:cNvCxnSpPr>
+            <a:cxnSpLocks/>
+          </p:cNvCxnSpPr>
+          <p:nvPr/>
+        </p:nvCxnSpPr>
+        <p:spPr>
+          <a:xfrm flipH="1" flipV="1">
+            <a:off x="1607514" y="926110"/>
+            <a:ext cx="5714120" cy="721408"/>
+          </a:xfrm>
+          <a:prstGeom prst="bentConnector3">
+            <a:avLst>
+              <a:gd name="adj1" fmla="val 159"/>
+            </a:avLst>
+          </a:prstGeom>
+          <a:ln>
+            <a:solidFill>
+              <a:schemeClr val="tx1">
+                <a:lumMod val="50000"/>
+                <a:lumOff val="50000"/>
+              </a:schemeClr>
+            </a:solidFill>
+            <a:headEnd type="none"/>
+            <a:tailEnd type="triangle"/>
+          </a:ln>
+        </p:spPr>
+        <p:style>
+          <a:lnRef idx="1">
+            <a:schemeClr val="accent1"/>
+          </a:lnRef>
+          <a:fillRef idx="0">
+            <a:schemeClr val="accent1"/>
+          </a:fillRef>
+          <a:effectRef idx="0">
+            <a:schemeClr val="accent1"/>
+          </a:effectRef>
+          <a:fontRef idx="minor">
+            <a:schemeClr val="tx1"/>
+          </a:fontRef>
+        </p:style>
+      </p:cxnSp>
+      <p:cxnSp>
+        <p:nvCxnSpPr>
+          <p:cNvPr id="163" name="Connector: Elbow 162">
+            <a:extLst>
+              <a:ext uri="{FF2B5EF4-FFF2-40B4-BE49-F238E27FC236}">
+                <a16:creationId xmlns:a16="http://schemas.microsoft.com/office/drawing/2014/main" id="{368C4226-3B93-407E-8EE6-756DBE1D2862}"/>
+              </a:ext>
+            </a:extLst>
+          </p:cNvPr>
+          <p:cNvCxnSpPr>
+            <a:cxnSpLocks/>
+          </p:cNvCxnSpPr>
+          <p:nvPr/>
+        </p:nvCxnSpPr>
+        <p:spPr>
+          <a:xfrm rot="10800000" flipH="1" flipV="1">
+            <a:off x="1683948" y="1181934"/>
+            <a:ext cx="5342369" cy="560591"/>
+          </a:xfrm>
+          <a:prstGeom prst="bentConnector3">
+            <a:avLst>
+              <a:gd name="adj1" fmla="val 50000"/>
+            </a:avLst>
+          </a:prstGeom>
+          <a:ln>
+            <a:solidFill>
+              <a:schemeClr val="tx1">
+                <a:lumMod val="50000"/>
+                <a:lumOff val="50000"/>
+              </a:schemeClr>
+            </a:solidFill>
+            <a:headEnd type="none"/>
+            <a:tailEnd type="triangle"/>
+          </a:ln>
+        </p:spPr>
+        <p:style>
+          <a:lnRef idx="1">
+            <a:schemeClr val="accent1"/>
+          </a:lnRef>
+          <a:fillRef idx="0">
+            <a:schemeClr val="accent1"/>
+          </a:fillRef>
+          <a:effectRef idx="0">
+            <a:schemeClr val="accent1"/>
+          </a:effectRef>
+          <a:fontRef idx="minor">
+            <a:schemeClr val="tx1"/>
+          </a:fontRef>
+        </p:style>
+      </p:cxnSp>
+      <p:grpSp>
+        <p:nvGrpSpPr>
+          <p:cNvPr id="185" name="Group 184">
+            <a:extLst>
+              <a:ext uri="{FF2B5EF4-FFF2-40B4-BE49-F238E27FC236}">
+                <a16:creationId xmlns:a16="http://schemas.microsoft.com/office/drawing/2014/main" id="{9C0A8475-2F7F-44D1-B1BF-378CCE31B77F}"/>
+              </a:ext>
+            </a:extLst>
+          </p:cNvPr>
+          <p:cNvGrpSpPr/>
+          <p:nvPr/>
+        </p:nvGrpSpPr>
+        <p:grpSpPr>
+          <a:xfrm>
+            <a:off x="6303778" y="1983141"/>
+            <a:ext cx="565756" cy="481502"/>
+            <a:chOff x="2907071" y="1178090"/>
+            <a:chExt cx="565756" cy="481502"/>
+          </a:xfrm>
+        </p:grpSpPr>
+        <p:sp>
+          <p:nvSpPr>
+            <p:cNvPr id="172" name="Rectangle 171">
+              <a:extLst>
+                <a:ext uri="{FF2B5EF4-FFF2-40B4-BE49-F238E27FC236}">
+                  <a16:creationId xmlns:a16="http://schemas.microsoft.com/office/drawing/2014/main" id="{42E7CC58-4974-4B19-9AAD-7CA331F4DA77}"/>
+                </a:ext>
+              </a:extLst>
+            </p:cNvPr>
+            <p:cNvSpPr/>
+            <p:nvPr/>
+          </p:nvSpPr>
+          <p:spPr>
+            <a:xfrm>
+              <a:off x="2980384" y="1197927"/>
+              <a:ext cx="492443" cy="461665"/>
+            </a:xfrm>
+            <a:prstGeom prst="rect">
+              <a:avLst/>
+            </a:prstGeom>
+          </p:spPr>
+          <p:txBody>
+            <a:bodyPr wrap="none">
+              <a:spAutoFit/>
+            </a:bodyPr>
+            <a:lstStyle/>
+            <a:p>
+              <a:r>
+                <a:rPr lang="en-US" sz="2400" b="1" dirty="0">
+                  <a:solidFill>
+                    <a:schemeClr val="tx1">
+                      <a:lumMod val="50000"/>
+                      <a:lumOff val="50000"/>
+                    </a:schemeClr>
+                  </a:solidFill>
+                  <a:latin typeface="Font Awesome 5 Free Solid" panose="02000503000000000000" pitchFamily="50" charset="0"/>
+                </a:rPr>
+                <a:t></a:t>
+              </a:r>
+              <a:endParaRPr lang="en-US" sz="2400" dirty="0">
+                <a:solidFill>
+                  <a:schemeClr val="tx1">
+                    <a:lumMod val="50000"/>
+                    <a:lumOff val="50000"/>
+                  </a:schemeClr>
+                </a:solidFill>
+                <a:latin typeface="Font Awesome 5 Free Solid" panose="02000503000000000000" pitchFamily="50" charset="0"/>
+              </a:endParaRPr>
+            </a:p>
+          </p:txBody>
+        </p:sp>
+        <p:sp>
+          <p:nvSpPr>
+            <p:cNvPr id="63" name="Oval 62">
+              <a:extLst>
+                <a:ext uri="{FF2B5EF4-FFF2-40B4-BE49-F238E27FC236}">
+                  <a16:creationId xmlns:a16="http://schemas.microsoft.com/office/drawing/2014/main" id="{8F997E3B-59D1-4B63-8C45-2BD2DC1BB1D5}"/>
+                </a:ext>
+              </a:extLst>
+            </p:cNvPr>
+            <p:cNvSpPr/>
+            <p:nvPr/>
+          </p:nvSpPr>
+          <p:spPr>
+            <a:xfrm>
+              <a:off x="2907071" y="1178090"/>
+              <a:ext cx="256032" cy="256390"/>
+            </a:xfrm>
+            <a:prstGeom prst="ellipse">
+              <a:avLst/>
+            </a:prstGeom>
+            <a:solidFill>
+              <a:schemeClr val="tx1">
+                <a:lumMod val="65000"/>
+                <a:lumOff val="35000"/>
+              </a:schemeClr>
+            </a:solidFill>
+          </p:spPr>
+          <p:style>
+            <a:lnRef idx="2">
+              <a:schemeClr val="accent1">
+                <a:shade val="50000"/>
+              </a:schemeClr>
+            </a:lnRef>
+            <a:fillRef idx="1">
+              <a:schemeClr val="accent1"/>
+            </a:fillRef>
+            <a:effectRef idx="0">
+              <a:schemeClr val="accent1"/>
+            </a:effectRef>
+            <a:fontRef idx="minor">
+              <a:schemeClr val="lt1"/>
+            </a:fontRef>
+          </p:style>
+          <p:txBody>
+            <a:bodyPr rtlCol="0" anchor="ctr"/>
+            <a:lstStyle/>
+            <a:p>
+              <a:pPr algn="ctr"/>
+              <a:r>
+                <a:rPr lang="en-US" sz="1100" dirty="0"/>
+                <a:t>5</a:t>
+              </a:r>
+            </a:p>
+          </p:txBody>
+        </p:sp>
+      </p:grpSp>
+      <p:cxnSp>
+        <p:nvCxnSpPr>
+          <p:cNvPr id="174" name="Connector: Elbow 173">
+            <a:extLst>
+              <a:ext uri="{FF2B5EF4-FFF2-40B4-BE49-F238E27FC236}">
+                <a16:creationId xmlns:a16="http://schemas.microsoft.com/office/drawing/2014/main" id="{A0706075-90F0-474A-8870-02930EA3A8AD}"/>
+              </a:ext>
+            </a:extLst>
+          </p:cNvPr>
+          <p:cNvCxnSpPr>
+            <a:cxnSpLocks/>
+          </p:cNvCxnSpPr>
+          <p:nvPr/>
+        </p:nvCxnSpPr>
+        <p:spPr>
+          <a:xfrm rot="5400000">
+            <a:off x="5538614" y="3415049"/>
+            <a:ext cx="1740247" cy="3"/>
+          </a:xfrm>
+          <a:prstGeom prst="bentConnector3">
+            <a:avLst/>
+          </a:prstGeom>
+          <a:ln>
+            <a:solidFill>
+              <a:schemeClr val="tx1">
+                <a:lumMod val="50000"/>
+                <a:lumOff val="50000"/>
+              </a:schemeClr>
+            </a:solidFill>
+            <a:headEnd type="triangle"/>
+            <a:tailEnd type="none"/>
+          </a:ln>
+        </p:spPr>
+        <p:style>
+          <a:lnRef idx="1">
+            <a:schemeClr val="accent1"/>
+          </a:lnRef>
+          <a:fillRef idx="0">
+            <a:schemeClr val="accent1"/>
+          </a:fillRef>
+          <a:effectRef idx="0">
+            <a:schemeClr val="accent1"/>
+          </a:effectRef>
+          <a:fontRef idx="minor">
+            <a:schemeClr val="tx1"/>
+          </a:fontRef>
+        </p:style>
+      </p:cxnSp>
+      <p:cxnSp>
+        <p:nvCxnSpPr>
+          <p:cNvPr id="177" name="Connector: Elbow 176">
+            <a:extLst>
+              <a:ext uri="{FF2B5EF4-FFF2-40B4-BE49-F238E27FC236}">
+                <a16:creationId xmlns:a16="http://schemas.microsoft.com/office/drawing/2014/main" id="{1E6F7211-7F27-47C2-99DB-7997958DA845}"/>
+              </a:ext>
+            </a:extLst>
+          </p:cNvPr>
+          <p:cNvCxnSpPr/>
+          <p:nvPr/>
+        </p:nvCxnSpPr>
+        <p:spPr>
+          <a:xfrm rot="16200000" flipV="1">
+            <a:off x="6005473" y="3504795"/>
+            <a:ext cx="1375912" cy="0"/>
+          </a:xfrm>
+          <a:prstGeom prst="bentConnector3">
+            <a:avLst/>
+          </a:prstGeom>
+          <a:ln>
+            <a:solidFill>
+              <a:schemeClr val="tx1">
+                <a:lumMod val="50000"/>
+                <a:lumOff val="50000"/>
+              </a:schemeClr>
+            </a:solidFill>
+            <a:headEnd type="triangle"/>
+            <a:tailEnd type="none"/>
+          </a:ln>
+        </p:spPr>
+        <p:style>
+          <a:lnRef idx="1">
+            <a:schemeClr val="accent1"/>
+          </a:lnRef>
+          <a:fillRef idx="0">
+            <a:schemeClr val="accent1"/>
+          </a:fillRef>
+          <a:effectRef idx="0">
+            <a:schemeClr val="accent1"/>
+          </a:effectRef>
+          <a:fontRef idx="minor">
+            <a:schemeClr val="tx1"/>
+          </a:fontRef>
+        </p:style>
+      </p:cxnSp>
+      <p:cxnSp>
+        <p:nvCxnSpPr>
+          <p:cNvPr id="179" name="Straight Arrow Connector 178">
+            <a:extLst>
+              <a:ext uri="{FF2B5EF4-FFF2-40B4-BE49-F238E27FC236}">
+                <a16:creationId xmlns:a16="http://schemas.microsoft.com/office/drawing/2014/main" id="{21D7397C-2BE4-407D-943C-BCA8A62EEEFD}"/>
+              </a:ext>
+            </a:extLst>
+          </p:cNvPr>
+          <p:cNvCxnSpPr>
+            <a:cxnSpLocks/>
+          </p:cNvCxnSpPr>
+          <p:nvPr/>
+        </p:nvCxnSpPr>
+        <p:spPr>
+          <a:xfrm>
+            <a:off x="7085666" y="2674375"/>
+            <a:ext cx="0" cy="1489185"/>
+          </a:xfrm>
+          <a:prstGeom prst="straightConnector1">
+            <a:avLst/>
+          </a:prstGeom>
+          <a:ln>
+            <a:solidFill>
+              <a:schemeClr val="tx1">
+                <a:lumMod val="50000"/>
+                <a:lumOff val="50000"/>
+              </a:schemeClr>
+            </a:solidFill>
+            <a:headEnd type="triangle"/>
+            <a:tailEnd type="none"/>
+          </a:ln>
+        </p:spPr>
+        <p:style>
+          <a:lnRef idx="1">
+            <a:schemeClr val="accent1"/>
+          </a:lnRef>
+          <a:fillRef idx="0">
+            <a:schemeClr val="accent1"/>
+          </a:fillRef>
+          <a:effectRef idx="0">
+            <a:schemeClr val="accent1"/>
+          </a:effectRef>
+          <a:fontRef idx="minor">
+            <a:schemeClr val="tx1"/>
+          </a:fontRef>
+        </p:style>
+      </p:cxnSp>
+      <p:cxnSp>
+        <p:nvCxnSpPr>
+          <p:cNvPr id="181" name="Straight Arrow Connector 180">
+            <a:extLst>
+              <a:ext uri="{FF2B5EF4-FFF2-40B4-BE49-F238E27FC236}">
+                <a16:creationId xmlns:a16="http://schemas.microsoft.com/office/drawing/2014/main" id="{EAA58084-BD69-4991-A8F7-A8F5EF6F5FE4}"/>
+              </a:ext>
+            </a:extLst>
+          </p:cNvPr>
+          <p:cNvCxnSpPr>
+            <a:cxnSpLocks/>
+          </p:cNvCxnSpPr>
+          <p:nvPr/>
+        </p:nvCxnSpPr>
+        <p:spPr>
+          <a:xfrm flipV="1">
+            <a:off x="7436387" y="2816838"/>
+            <a:ext cx="0" cy="1304522"/>
+          </a:xfrm>
+          <a:prstGeom prst="straightConnector1">
+            <a:avLst/>
+          </a:prstGeom>
+          <a:ln>
+            <a:solidFill>
+              <a:schemeClr val="tx1">
+                <a:lumMod val="50000"/>
+                <a:lumOff val="50000"/>
+              </a:schemeClr>
+            </a:solidFill>
+            <a:headEnd type="triangle"/>
+            <a:tailEnd type="none"/>
+          </a:ln>
+        </p:spPr>
+        <p:style>
+          <a:lnRef idx="1">
+            <a:schemeClr val="accent1"/>
+          </a:lnRef>
+          <a:fillRef idx="0">
+            <a:schemeClr val="accent1"/>
+          </a:fillRef>
+          <a:effectRef idx="0">
+            <a:schemeClr val="accent1"/>
+          </a:effectRef>
+          <a:fontRef idx="minor">
+            <a:schemeClr val="tx1"/>
+          </a:fontRef>
+        </p:style>
+      </p:cxnSp>
+      <p:grpSp>
+        <p:nvGrpSpPr>
+          <p:cNvPr id="186" name="Group 185">
+            <a:extLst>
+              <a:ext uri="{FF2B5EF4-FFF2-40B4-BE49-F238E27FC236}">
+                <a16:creationId xmlns:a16="http://schemas.microsoft.com/office/drawing/2014/main" id="{F16D3AE4-9333-41AA-A849-CBDDF499E736}"/>
+              </a:ext>
+            </a:extLst>
+          </p:cNvPr>
+          <p:cNvGrpSpPr/>
+          <p:nvPr/>
+        </p:nvGrpSpPr>
+        <p:grpSpPr>
+          <a:xfrm>
+            <a:off x="7893635" y="2036894"/>
+            <a:ext cx="565756" cy="481502"/>
+            <a:chOff x="2907071" y="1178090"/>
+            <a:chExt cx="565756" cy="481502"/>
+          </a:xfrm>
+        </p:grpSpPr>
+        <p:sp>
+          <p:nvSpPr>
+            <p:cNvPr id="187" name="Rectangle 186">
+              <a:extLst>
+                <a:ext uri="{FF2B5EF4-FFF2-40B4-BE49-F238E27FC236}">
+                  <a16:creationId xmlns:a16="http://schemas.microsoft.com/office/drawing/2014/main" id="{34C5281F-499A-4769-AB88-1541B4C63A5B}"/>
+                </a:ext>
+              </a:extLst>
+            </p:cNvPr>
+            <p:cNvSpPr/>
+            <p:nvPr/>
+          </p:nvSpPr>
+          <p:spPr>
+            <a:xfrm>
+              <a:off x="2980384" y="1197927"/>
+              <a:ext cx="492443" cy="461665"/>
+            </a:xfrm>
+            <a:prstGeom prst="rect">
+              <a:avLst/>
+            </a:prstGeom>
+          </p:spPr>
+          <p:txBody>
+            <a:bodyPr wrap="none">
+              <a:spAutoFit/>
+            </a:bodyPr>
+            <a:lstStyle/>
+            <a:p>
+              <a:r>
+                <a:rPr lang="en-US" sz="2400" b="1" dirty="0">
+                  <a:solidFill>
+                    <a:schemeClr val="tx1">
+                      <a:lumMod val="50000"/>
+                      <a:lumOff val="50000"/>
+                    </a:schemeClr>
+                  </a:solidFill>
+                  <a:latin typeface="Font Awesome 5 Free Solid" panose="02000503000000000000" pitchFamily="50" charset="0"/>
+                </a:rPr>
+                <a:t></a:t>
+              </a:r>
+              <a:endParaRPr lang="en-US" sz="2400" dirty="0">
+                <a:solidFill>
+                  <a:schemeClr val="tx1">
+                    <a:lumMod val="50000"/>
+                    <a:lumOff val="50000"/>
+                  </a:schemeClr>
+                </a:solidFill>
+                <a:latin typeface="Font Awesome 5 Free Solid" panose="02000503000000000000" pitchFamily="50" charset="0"/>
+              </a:endParaRPr>
+            </a:p>
+          </p:txBody>
+        </p:sp>
+        <p:sp>
+          <p:nvSpPr>
+            <p:cNvPr id="188" name="Oval 187">
+              <a:extLst>
+                <a:ext uri="{FF2B5EF4-FFF2-40B4-BE49-F238E27FC236}">
+                  <a16:creationId xmlns:a16="http://schemas.microsoft.com/office/drawing/2014/main" id="{D6B38260-6E1A-4D2E-997D-055AF67624CA}"/>
+                </a:ext>
+              </a:extLst>
+            </p:cNvPr>
+            <p:cNvSpPr/>
+            <p:nvPr/>
+          </p:nvSpPr>
+          <p:spPr>
+            <a:xfrm>
+              <a:off x="2907071" y="1178090"/>
+              <a:ext cx="256032" cy="256390"/>
+            </a:xfrm>
+            <a:prstGeom prst="ellipse">
+              <a:avLst/>
+            </a:prstGeom>
+            <a:solidFill>
+              <a:schemeClr val="tx1">
+                <a:lumMod val="65000"/>
+                <a:lumOff val="35000"/>
+              </a:schemeClr>
+            </a:solidFill>
+          </p:spPr>
+          <p:style>
+            <a:lnRef idx="2">
+              <a:schemeClr val="accent1">
+                <a:shade val="50000"/>
+              </a:schemeClr>
+            </a:lnRef>
+            <a:fillRef idx="1">
+              <a:schemeClr val="accent1"/>
+            </a:fillRef>
+            <a:effectRef idx="0">
+              <a:schemeClr val="accent1"/>
+            </a:effectRef>
+            <a:fontRef idx="minor">
+              <a:schemeClr val="lt1"/>
+            </a:fontRef>
+          </p:style>
+          <p:txBody>
+            <a:bodyPr rtlCol="0" anchor="ctr"/>
+            <a:lstStyle/>
+            <a:p>
+              <a:pPr algn="ctr"/>
+              <a:r>
+                <a:rPr lang="en-US" sz="1100" dirty="0"/>
+                <a:t>8</a:t>
+              </a:r>
+            </a:p>
+          </p:txBody>
+        </p:sp>
+      </p:grpSp>
+      <p:sp>
+        <p:nvSpPr>
+          <p:cNvPr id="190" name="Title 189">
+            <a:extLst>
+              <a:ext uri="{FF2B5EF4-FFF2-40B4-BE49-F238E27FC236}">
+                <a16:creationId xmlns:a16="http://schemas.microsoft.com/office/drawing/2014/main" id="{7D82497B-7ABE-4511-BDC6-07CC4BE8C0E1}"/>
+              </a:ext>
+            </a:extLst>
+          </p:cNvPr>
+          <p:cNvSpPr>
+            <a:spLocks noGrp="1"/>
+          </p:cNvSpPr>
+          <p:nvPr>
+            <p:ph type="title"/>
+          </p:nvPr>
+        </p:nvSpPr>
+        <p:spPr>
+          <a:xfrm>
+            <a:off x="838200" y="215401"/>
+            <a:ext cx="10515600" cy="464244"/>
+          </a:xfrm>
+        </p:spPr>
+        <p:txBody>
+          <a:bodyPr>
+            <a:noAutofit/>
+          </a:bodyPr>
+          <a:lstStyle/>
+          <a:p>
+            <a:pPr algn="ctr"/>
+            <a:r>
+              <a:rPr lang="en-US" sz="2000" b="1" dirty="0"/>
+              <a:t>Hybrid Flow with JWT Client Assertion</a:t>
+            </a:r>
+          </a:p>
+        </p:txBody>
+      </p:sp>
+      <p:cxnSp>
+        <p:nvCxnSpPr>
+          <p:cNvPr id="191" name="Straight Arrow Connector 190">
+            <a:extLst>
+              <a:ext uri="{FF2B5EF4-FFF2-40B4-BE49-F238E27FC236}">
+                <a16:creationId xmlns:a16="http://schemas.microsoft.com/office/drawing/2014/main" id="{12FD4F5F-8E93-40CC-8AD3-979D4991263E}"/>
+              </a:ext>
+            </a:extLst>
+          </p:cNvPr>
+          <p:cNvCxnSpPr>
+            <a:cxnSpLocks/>
+          </p:cNvCxnSpPr>
+          <p:nvPr/>
+        </p:nvCxnSpPr>
+        <p:spPr>
+          <a:xfrm>
+            <a:off x="8115523" y="2591481"/>
+            <a:ext cx="2119954" cy="0"/>
+          </a:xfrm>
+          <a:prstGeom prst="straightConnector1">
+            <a:avLst/>
+          </a:prstGeom>
+          <a:ln>
+            <a:solidFill>
+              <a:schemeClr val="tx1">
+                <a:lumMod val="50000"/>
+                <a:lumOff val="50000"/>
+              </a:schemeClr>
+            </a:solidFill>
+            <a:headEnd type="triangle"/>
+            <a:tailEnd type="triangle"/>
+          </a:ln>
+        </p:spPr>
+        <p:style>
+          <a:lnRef idx="1">
+            <a:schemeClr val="accent1"/>
+          </a:lnRef>
+          <a:fillRef idx="0">
+            <a:schemeClr val="accent1"/>
+          </a:fillRef>
+          <a:effectRef idx="0">
+            <a:schemeClr val="accent1"/>
+          </a:effectRef>
+          <a:fontRef idx="minor">
+            <a:schemeClr val="tx1"/>
+          </a:fontRef>
+        </p:style>
+      </p:cxnSp>
+      <p:sp>
+        <p:nvSpPr>
+          <p:cNvPr id="192" name="Oval 191">
+            <a:extLst>
+              <a:ext uri="{FF2B5EF4-FFF2-40B4-BE49-F238E27FC236}">
+                <a16:creationId xmlns:a16="http://schemas.microsoft.com/office/drawing/2014/main" id="{BF4E30D2-E9F0-425D-B896-D72E25847E3D}"/>
+              </a:ext>
+            </a:extLst>
+          </p:cNvPr>
+          <p:cNvSpPr>
+            <a:spLocks noChangeAspect="1"/>
+          </p:cNvSpPr>
+          <p:nvPr/>
+        </p:nvSpPr>
+        <p:spPr>
+          <a:xfrm>
+            <a:off x="8943139" y="2464643"/>
+            <a:ext cx="255675" cy="256032"/>
+          </a:xfrm>
+          <a:prstGeom prst="ellipse">
+            <a:avLst/>
+          </a:prstGeom>
+          <a:solidFill>
+            <a:schemeClr val="tx1">
+              <a:lumMod val="65000"/>
+              <a:lumOff val="35000"/>
+            </a:schemeClr>
+          </a:solidFill>
+        </p:spPr>
+        <p:style>
+          <a:lnRef idx="2">
+            <a:schemeClr val="accent1">
+              <a:shade val="50000"/>
+            </a:schemeClr>
+          </a:lnRef>
+          <a:fillRef idx="1">
+            <a:schemeClr val="accent1"/>
+          </a:fillRef>
+          <a:effectRef idx="0">
+            <a:schemeClr val="accent1"/>
+          </a:effectRef>
+          <a:fontRef idx="minor">
+            <a:schemeClr val="lt1"/>
+          </a:fontRef>
+        </p:style>
+        <p:txBody>
+          <a:bodyPr lIns="0" tIns="0" rIns="0" bIns="0" rtlCol="0" anchor="ctr"/>
+          <a:lstStyle/>
+          <a:p>
+            <a:pPr algn="ctr"/>
+            <a:r>
+              <a:rPr lang="en-US" sz="1100" dirty="0"/>
+              <a:t>11</a:t>
+            </a:r>
+          </a:p>
+        </p:txBody>
+      </p:sp>
+      <p:sp>
+        <p:nvSpPr>
+          <p:cNvPr id="193" name="Oval 192">
+            <a:extLst>
+              <a:ext uri="{FF2B5EF4-FFF2-40B4-BE49-F238E27FC236}">
+                <a16:creationId xmlns:a16="http://schemas.microsoft.com/office/drawing/2014/main" id="{76A2707B-1AE5-493A-A491-780B6C8C40A5}"/>
+              </a:ext>
+            </a:extLst>
+          </p:cNvPr>
+          <p:cNvSpPr>
+            <a:spLocks noChangeAspect="1"/>
+          </p:cNvSpPr>
+          <p:nvPr/>
+        </p:nvSpPr>
+        <p:spPr>
+          <a:xfrm>
+            <a:off x="8943139" y="4831520"/>
+            <a:ext cx="255675" cy="256032"/>
+          </a:xfrm>
+          <a:prstGeom prst="ellipse">
+            <a:avLst/>
+          </a:prstGeom>
+          <a:solidFill>
+            <a:schemeClr val="tx1">
+              <a:lumMod val="65000"/>
+              <a:lumOff val="35000"/>
+            </a:schemeClr>
+          </a:solidFill>
+        </p:spPr>
+        <p:style>
+          <a:lnRef idx="2">
+            <a:schemeClr val="accent1">
+              <a:shade val="50000"/>
+            </a:schemeClr>
+          </a:lnRef>
+          <a:fillRef idx="1">
+            <a:schemeClr val="accent1"/>
+          </a:fillRef>
+          <a:effectRef idx="0">
+            <a:schemeClr val="accent1"/>
+          </a:effectRef>
+          <a:fontRef idx="minor">
+            <a:schemeClr val="lt1"/>
+          </a:fontRef>
+        </p:style>
+        <p:txBody>
+          <a:bodyPr lIns="0" tIns="0" rIns="0" bIns="0" rtlCol="0" anchor="ctr"/>
+          <a:lstStyle/>
+          <a:p>
+            <a:pPr algn="ctr"/>
+            <a:r>
+              <a:rPr lang="en-US" sz="1100" dirty="0"/>
+              <a:t>13</a:t>
+            </a:r>
+          </a:p>
+        </p:txBody>
+      </p:sp>
+      <p:cxnSp>
+        <p:nvCxnSpPr>
+          <p:cNvPr id="50" name="Straight Arrow Connector 49">
+            <a:extLst>
+              <a:ext uri="{FF2B5EF4-FFF2-40B4-BE49-F238E27FC236}">
+                <a16:creationId xmlns:a16="http://schemas.microsoft.com/office/drawing/2014/main" id="{46A82E57-6989-42E7-A92D-492425473D3F}"/>
+              </a:ext>
+            </a:extLst>
+          </p:cNvPr>
+          <p:cNvCxnSpPr>
+            <a:cxnSpLocks/>
+          </p:cNvCxnSpPr>
+          <p:nvPr/>
+        </p:nvCxnSpPr>
+        <p:spPr>
+          <a:xfrm>
+            <a:off x="7735119" y="2662654"/>
+            <a:ext cx="0" cy="1489185"/>
+          </a:xfrm>
+          <a:prstGeom prst="straightConnector1">
+            <a:avLst/>
+          </a:prstGeom>
+          <a:ln>
+            <a:solidFill>
+              <a:schemeClr val="tx1">
+                <a:lumMod val="50000"/>
+                <a:lumOff val="50000"/>
+              </a:schemeClr>
+            </a:solidFill>
+            <a:headEnd type="triangle"/>
+            <a:tailEnd type="none"/>
+          </a:ln>
+        </p:spPr>
+        <p:style>
+          <a:lnRef idx="1">
+            <a:schemeClr val="accent1"/>
+          </a:lnRef>
+          <a:fillRef idx="0">
+            <a:schemeClr val="accent1"/>
+          </a:fillRef>
+          <a:effectRef idx="0">
+            <a:schemeClr val="accent1"/>
+          </a:effectRef>
+          <a:fontRef idx="minor">
+            <a:schemeClr val="tx1"/>
+          </a:fontRef>
+        </p:style>
+      </p:cxnSp>
+      <p:sp>
+        <p:nvSpPr>
+          <p:cNvPr id="51" name="Oval 50">
+            <a:extLst>
+              <a:ext uri="{FF2B5EF4-FFF2-40B4-BE49-F238E27FC236}">
+                <a16:creationId xmlns:a16="http://schemas.microsoft.com/office/drawing/2014/main" id="{EC03C8D2-E1D4-45EA-A3E2-C312C88F390E}"/>
+              </a:ext>
+            </a:extLst>
+          </p:cNvPr>
+          <p:cNvSpPr>
+            <a:spLocks noChangeAspect="1"/>
+          </p:cNvSpPr>
+          <p:nvPr/>
+        </p:nvSpPr>
+        <p:spPr>
+          <a:xfrm>
+            <a:off x="7606381" y="3443751"/>
+            <a:ext cx="255675" cy="256032"/>
+          </a:xfrm>
+          <a:prstGeom prst="ellipse">
+            <a:avLst/>
+          </a:prstGeom>
+          <a:solidFill>
+            <a:schemeClr val="tx1">
+              <a:lumMod val="65000"/>
+              <a:lumOff val="35000"/>
+            </a:schemeClr>
+          </a:solidFill>
+        </p:spPr>
+        <p:style>
+          <a:lnRef idx="2">
+            <a:schemeClr val="accent1">
+              <a:shade val="50000"/>
+            </a:schemeClr>
+          </a:lnRef>
+          <a:fillRef idx="1">
+            <a:schemeClr val="accent1"/>
+          </a:fillRef>
+          <a:effectRef idx="0">
+            <a:schemeClr val="accent1"/>
+          </a:effectRef>
+          <a:fontRef idx="minor">
+            <a:schemeClr val="lt1"/>
+          </a:fontRef>
+        </p:style>
+        <p:txBody>
+          <a:bodyPr lIns="0" tIns="0" rIns="0" bIns="0" rtlCol="0" anchor="ctr"/>
+          <a:lstStyle/>
+          <a:p>
+            <a:pPr algn="ctr"/>
+            <a:r>
+              <a:rPr lang="en-US" sz="1100" dirty="0"/>
+              <a:t>10</a:t>
+            </a:r>
+          </a:p>
+        </p:txBody>
+      </p:sp>
+      <p:sp>
+        <p:nvSpPr>
+          <p:cNvPr id="52" name="Oval 51">
+            <a:extLst>
+              <a:ext uri="{FF2B5EF4-FFF2-40B4-BE49-F238E27FC236}">
+                <a16:creationId xmlns:a16="http://schemas.microsoft.com/office/drawing/2014/main" id="{1D47A383-9E29-4337-BF72-26E9D419C547}"/>
+              </a:ext>
+            </a:extLst>
+          </p:cNvPr>
+          <p:cNvSpPr>
+            <a:spLocks noChangeAspect="1"/>
+          </p:cNvSpPr>
+          <p:nvPr/>
+        </p:nvSpPr>
+        <p:spPr>
+          <a:xfrm>
+            <a:off x="7935781" y="3137904"/>
+            <a:ext cx="255675" cy="256032"/>
+          </a:xfrm>
+          <a:prstGeom prst="ellipse">
+            <a:avLst/>
+          </a:prstGeom>
+          <a:solidFill>
+            <a:schemeClr val="tx1">
+              <a:lumMod val="65000"/>
+              <a:lumOff val="35000"/>
+            </a:schemeClr>
+          </a:solidFill>
+        </p:spPr>
+        <p:style>
+          <a:lnRef idx="2">
+            <a:schemeClr val="accent1">
+              <a:shade val="50000"/>
+            </a:schemeClr>
+          </a:lnRef>
+          <a:fillRef idx="1">
+            <a:schemeClr val="accent1"/>
+          </a:fillRef>
+          <a:effectRef idx="0">
+            <a:schemeClr val="accent1"/>
+          </a:effectRef>
+          <a:fontRef idx="minor">
+            <a:schemeClr val="lt1"/>
+          </a:fontRef>
+        </p:style>
+        <p:txBody>
+          <a:bodyPr lIns="0" tIns="0" rIns="0" bIns="0" rtlCol="0" anchor="ctr"/>
+          <a:lstStyle/>
+          <a:p>
+            <a:pPr algn="ctr"/>
+            <a:r>
+              <a:rPr lang="en-US" sz="1100" dirty="0"/>
+              <a:t>12</a:t>
+            </a:r>
+          </a:p>
+        </p:txBody>
+      </p:sp>
+      <p:cxnSp>
+        <p:nvCxnSpPr>
+          <p:cNvPr id="53" name="Straight Arrow Connector 52">
+            <a:extLst>
+              <a:ext uri="{FF2B5EF4-FFF2-40B4-BE49-F238E27FC236}">
+                <a16:creationId xmlns:a16="http://schemas.microsoft.com/office/drawing/2014/main" id="{0F27D045-15C7-492D-B1DF-C0B83E5B7D9C}"/>
+              </a:ext>
+            </a:extLst>
+          </p:cNvPr>
+          <p:cNvCxnSpPr>
+            <a:cxnSpLocks/>
+          </p:cNvCxnSpPr>
+          <p:nvPr/>
+        </p:nvCxnSpPr>
+        <p:spPr>
+          <a:xfrm flipV="1">
+            <a:off x="8053022" y="2828563"/>
+            <a:ext cx="0" cy="1304522"/>
+          </a:xfrm>
+          <a:prstGeom prst="straightConnector1">
+            <a:avLst/>
+          </a:prstGeom>
+          <a:ln>
+            <a:solidFill>
+              <a:schemeClr val="tx1">
+                <a:lumMod val="50000"/>
+                <a:lumOff val="50000"/>
+              </a:schemeClr>
+            </a:solidFill>
+            <a:headEnd type="triangle"/>
+            <a:tailEnd type="none"/>
+          </a:ln>
+        </p:spPr>
+        <p:style>
+          <a:lnRef idx="1">
+            <a:schemeClr val="accent1"/>
+          </a:lnRef>
+          <a:fillRef idx="0">
+            <a:schemeClr val="accent1"/>
+          </a:fillRef>
+          <a:effectRef idx="0">
+            <a:schemeClr val="accent1"/>
+          </a:effectRef>
+          <a:fontRef idx="minor">
+            <a:schemeClr val="tx1"/>
+          </a:fontRef>
+        </p:style>
+      </p:cxnSp>
+    </p:spTree>
+    <p:extLst>
+      <p:ext uri="{BB962C8B-B14F-4D97-AF65-F5344CB8AC3E}">
+        <p14:creationId xmlns:p14="http://schemas.microsoft.com/office/powerpoint/2010/main" val="1933271923"/>
       </p:ext>
     </p:extLst>
   </p:cSld>

</xml_diff>